<commit_message>
powerpoint detailing category design
</commit_message>
<xml_diff>
--- a/How to Create Your Own NETS Classification Category.pptx
+++ b/How to Create Your Own NETS Classification Category.pptx
@@ -7,17 +7,16 @@
   <p:sldIdLst>
     <p:sldId id="256" r:id="rId2"/>
     <p:sldId id="257" r:id="rId3"/>
-    <p:sldId id="259" r:id="rId4"/>
-    <p:sldId id="260" r:id="rId5"/>
-    <p:sldId id="261" r:id="rId6"/>
-    <p:sldId id="258" r:id="rId7"/>
-    <p:sldId id="262" r:id="rId8"/>
-    <p:sldId id="266" r:id="rId9"/>
-    <p:sldId id="263" r:id="rId10"/>
-    <p:sldId id="264" r:id="rId11"/>
-    <p:sldId id="265" r:id="rId12"/>
-    <p:sldId id="267" r:id="rId13"/>
-    <p:sldId id="268" r:id="rId14"/>
+    <p:sldId id="261" r:id="rId4"/>
+    <p:sldId id="259" r:id="rId5"/>
+    <p:sldId id="262" r:id="rId6"/>
+    <p:sldId id="263" r:id="rId7"/>
+    <p:sldId id="264" r:id="rId8"/>
+    <p:sldId id="265" r:id="rId9"/>
+    <p:sldId id="266" r:id="rId10"/>
+    <p:sldId id="267" r:id="rId11"/>
+    <p:sldId id="260" r:id="rId12"/>
+    <p:sldId id="268" r:id="rId13"/>
   </p:sldIdLst>
   <p:sldSz cx="9144000" cy="6858000" type="screen4x3"/>
   <p:notesSz cx="6858000" cy="9144000"/>
@@ -300,7 +299,7 @@
           <a:p>
             <a:fld id="{CC8566B0-8B34-49AA-9A8E-91E8A6ACD5C4}" type="datetimeFigureOut">
               <a:rPr lang="en-US" smtClean="0"/>
-              <a:t>8/19/2016</a:t>
+              <a:t>8/25/2016</a:t>
             </a:fld>
             <a:endParaRPr lang="en-US"/>
           </a:p>
@@ -470,7 +469,7 @@
           <a:p>
             <a:fld id="{CC8566B0-8B34-49AA-9A8E-91E8A6ACD5C4}" type="datetimeFigureOut">
               <a:rPr lang="en-US" smtClean="0"/>
-              <a:t>8/19/2016</a:t>
+              <a:t>8/25/2016</a:t>
             </a:fld>
             <a:endParaRPr lang="en-US"/>
           </a:p>
@@ -650,7 +649,7 @@
           <a:p>
             <a:fld id="{CC8566B0-8B34-49AA-9A8E-91E8A6ACD5C4}" type="datetimeFigureOut">
               <a:rPr lang="en-US" smtClean="0"/>
-              <a:t>8/19/2016</a:t>
+              <a:t>8/25/2016</a:t>
             </a:fld>
             <a:endParaRPr lang="en-US"/>
           </a:p>
@@ -820,7 +819,7 @@
           <a:p>
             <a:fld id="{CC8566B0-8B34-49AA-9A8E-91E8A6ACD5C4}" type="datetimeFigureOut">
               <a:rPr lang="en-US" smtClean="0"/>
-              <a:t>8/19/2016</a:t>
+              <a:t>8/25/2016</a:t>
             </a:fld>
             <a:endParaRPr lang="en-US"/>
           </a:p>
@@ -1066,7 +1065,7 @@
           <a:p>
             <a:fld id="{CC8566B0-8B34-49AA-9A8E-91E8A6ACD5C4}" type="datetimeFigureOut">
               <a:rPr lang="en-US" smtClean="0"/>
-              <a:t>8/19/2016</a:t>
+              <a:t>8/25/2016</a:t>
             </a:fld>
             <a:endParaRPr lang="en-US"/>
           </a:p>
@@ -1354,7 +1353,7 @@
           <a:p>
             <a:fld id="{CC8566B0-8B34-49AA-9A8E-91E8A6ACD5C4}" type="datetimeFigureOut">
               <a:rPr lang="en-US" smtClean="0"/>
-              <a:t>8/19/2016</a:t>
+              <a:t>8/25/2016</a:t>
             </a:fld>
             <a:endParaRPr lang="en-US"/>
           </a:p>
@@ -1776,7 +1775,7 @@
           <a:p>
             <a:fld id="{CC8566B0-8B34-49AA-9A8E-91E8A6ACD5C4}" type="datetimeFigureOut">
               <a:rPr lang="en-US" smtClean="0"/>
-              <a:t>8/19/2016</a:t>
+              <a:t>8/25/2016</a:t>
             </a:fld>
             <a:endParaRPr lang="en-US"/>
           </a:p>
@@ -1894,7 +1893,7 @@
           <a:p>
             <a:fld id="{CC8566B0-8B34-49AA-9A8E-91E8A6ACD5C4}" type="datetimeFigureOut">
               <a:rPr lang="en-US" smtClean="0"/>
-              <a:t>8/19/2016</a:t>
+              <a:t>8/25/2016</a:t>
             </a:fld>
             <a:endParaRPr lang="en-US"/>
           </a:p>
@@ -1989,7 +1988,7 @@
           <a:p>
             <a:fld id="{CC8566B0-8B34-49AA-9A8E-91E8A6ACD5C4}" type="datetimeFigureOut">
               <a:rPr lang="en-US" smtClean="0"/>
-              <a:t>8/19/2016</a:t>
+              <a:t>8/25/2016</a:t>
             </a:fld>
             <a:endParaRPr lang="en-US"/>
           </a:p>
@@ -2266,7 +2265,7 @@
           <a:p>
             <a:fld id="{CC8566B0-8B34-49AA-9A8E-91E8A6ACD5C4}" type="datetimeFigureOut">
               <a:rPr lang="en-US" smtClean="0"/>
-              <a:t>8/19/2016</a:t>
+              <a:t>8/25/2016</a:t>
             </a:fld>
             <a:endParaRPr lang="en-US"/>
           </a:p>
@@ -2519,7 +2518,7 @@
           <a:p>
             <a:fld id="{CC8566B0-8B34-49AA-9A8E-91E8A6ACD5C4}" type="datetimeFigureOut">
               <a:rPr lang="en-US" smtClean="0"/>
-              <a:t>8/19/2016</a:t>
+              <a:t>8/25/2016</a:t>
             </a:fld>
             <a:endParaRPr lang="en-US"/>
           </a:p>
@@ -2732,7 +2731,7 @@
           <a:p>
             <a:fld id="{CC8566B0-8B34-49AA-9A8E-91E8A6ACD5C4}" type="datetimeFigureOut">
               <a:rPr lang="en-US" smtClean="0"/>
-              <a:t>8/19/2016</a:t>
+              <a:t>8/25/2016</a:t>
             </a:fld>
             <a:endParaRPr lang="en-US"/>
           </a:p>
@@ -3124,7 +3123,7 @@
           <a:p>
             <a:r>
               <a:rPr lang="en-US" dirty="0" smtClean="0"/>
-              <a:t>How to Create Your Own NETS Classification Category</a:t>
+              <a:t>Creating NETS Business Categories</a:t>
             </a:r>
             <a:endParaRPr lang="en-US" dirty="0"/>
           </a:p>
@@ -3207,7 +3206,7 @@
           <a:p>
             <a:r>
               <a:rPr lang="en-US" dirty="0" smtClean="0"/>
-              <a:t>Conditionals</a:t>
+              <a:t>Physical Activity Facility Categories</a:t>
             </a:r>
             <a:endParaRPr lang="en-US" dirty="0"/>
           </a:p>
@@ -3226,158 +3225,27 @@
         <p:spPr/>
         <p:txBody>
           <a:bodyPr>
-            <a:normAutofit fontScale="77500" lnSpcReduction="20000"/>
+            <a:normAutofit fontScale="92500" lnSpcReduction="10000"/>
           </a:bodyPr>
           <a:lstStyle/>
           <a:p>
             <a:r>
               <a:rPr lang="en-US" dirty="0" smtClean="0"/>
-              <a:t>Categories can use any number of combinations of the true/false questions we’ve described.  A business belongs to a category if this Boolean conditional evaluates to True.  These are all the combinations we’ve identified and used:</a:t>
-            </a:r>
-          </a:p>
-          <a:p>
-            <a:pPr marL="971550" lvl="1" indent="-514350">
-              <a:buFont typeface="+mj-lt"/>
-              <a:buAutoNum type="arabicPeriod"/>
-            </a:pPr>
-            <a:r>
-              <a:rPr lang="en-US" dirty="0"/>
-              <a:t>name</a:t>
-            </a:r>
-          </a:p>
-          <a:p>
-            <a:pPr marL="971550" lvl="1" indent="-514350">
-              <a:buFont typeface="+mj-lt"/>
-              <a:buAutoNum type="arabicPeriod"/>
-            </a:pPr>
-            <a:r>
-              <a:rPr lang="en-US" dirty="0" err="1"/>
-              <a:t>sic_exclusive</a:t>
-            </a:r>
-            <a:r>
-              <a:rPr lang="en-US" dirty="0"/>
-              <a:t> OR (</a:t>
-            </a:r>
-            <a:r>
-              <a:rPr lang="en-US" dirty="0" err="1"/>
-              <a:t>sic_range</a:t>
-            </a:r>
-            <a:r>
-              <a:rPr lang="en-US" dirty="0"/>
-              <a:t> AND name)</a:t>
-            </a:r>
-          </a:p>
-          <a:p>
-            <a:pPr marL="971550" lvl="1" indent="-514350">
-              <a:buFont typeface="+mj-lt"/>
-              <a:buAutoNum type="arabicPeriod"/>
-            </a:pPr>
-            <a:r>
-              <a:rPr lang="en-US" dirty="0" err="1"/>
-              <a:t>sic_range</a:t>
-            </a:r>
-            <a:endParaRPr lang="en-US" dirty="0"/>
-          </a:p>
-          <a:p>
-            <a:pPr marL="971550" lvl="1" indent="-514350">
-              <a:buFont typeface="+mj-lt"/>
-              <a:buAutoNum type="arabicPeriod"/>
-            </a:pPr>
-            <a:r>
-              <a:rPr lang="en-US" dirty="0" err="1"/>
-              <a:t>sic_exclusive</a:t>
-            </a:r>
-            <a:r>
-              <a:rPr lang="en-US" dirty="0"/>
-              <a:t> OR </a:t>
-            </a:r>
-            <a:r>
-              <a:rPr lang="en-US" dirty="0" err="1"/>
-              <a:t>sic_range</a:t>
-            </a:r>
-            <a:endParaRPr lang="en-US" dirty="0"/>
-          </a:p>
-          <a:p>
-            <a:pPr marL="971550" lvl="1" indent="-514350">
-              <a:buFont typeface="+mj-lt"/>
-              <a:buAutoNum type="arabicPeriod"/>
-            </a:pPr>
-            <a:r>
-              <a:rPr lang="en-US" dirty="0" err="1"/>
-              <a:t>sic_range</a:t>
-            </a:r>
-            <a:r>
-              <a:rPr lang="en-US" dirty="0"/>
-              <a:t> AND </a:t>
-            </a:r>
-            <a:r>
-              <a:rPr lang="en-US" dirty="0" err="1"/>
-              <a:t>emp</a:t>
-            </a:r>
-            <a:endParaRPr lang="en-US" dirty="0"/>
-          </a:p>
-          <a:p>
-            <a:pPr marL="971550" lvl="1" indent="-514350">
-              <a:buFont typeface="+mj-lt"/>
-              <a:buAutoNum type="arabicPeriod"/>
-            </a:pPr>
-            <a:r>
-              <a:rPr lang="en-US" dirty="0" err="1"/>
-              <a:t>sic_range</a:t>
-            </a:r>
-            <a:r>
-              <a:rPr lang="en-US" dirty="0"/>
-              <a:t> AND (sales OR </a:t>
-            </a:r>
-            <a:r>
-              <a:rPr lang="en-US" dirty="0" err="1"/>
-              <a:t>emp</a:t>
-            </a:r>
-            <a:r>
-              <a:rPr lang="en-US" dirty="0"/>
-              <a:t>)</a:t>
-            </a:r>
-          </a:p>
-          <a:p>
-            <a:pPr marL="971550" lvl="1" indent="-514350">
-              <a:buFont typeface="+mj-lt"/>
-              <a:buAutoNum type="arabicPeriod"/>
-            </a:pPr>
-            <a:r>
-              <a:rPr lang="en-US" dirty="0" err="1"/>
-              <a:t>sic_range</a:t>
-            </a:r>
-            <a:r>
-              <a:rPr lang="en-US" dirty="0"/>
-              <a:t> OR (sic_range_2 AND name)</a:t>
-            </a:r>
-          </a:p>
-          <a:p>
-            <a:pPr marL="971550" lvl="1" indent="-514350">
-              <a:buFont typeface="+mj-lt"/>
-              <a:buAutoNum type="arabicPeriod"/>
-            </a:pPr>
-            <a:r>
-              <a:rPr lang="en-US" dirty="0" err="1"/>
-              <a:t>sic_exclusive</a:t>
-            </a:r>
-            <a:endParaRPr lang="en-US" dirty="0"/>
-          </a:p>
-          <a:p>
-            <a:pPr marL="971550" lvl="1" indent="-514350">
-              <a:buFont typeface="+mj-lt"/>
-              <a:buAutoNum type="arabicPeriod"/>
-            </a:pPr>
-            <a:r>
-              <a:rPr lang="en-US" dirty="0" err="1"/>
-              <a:t>sic_exclusive</a:t>
-            </a:r>
-            <a:r>
-              <a:rPr lang="en-US" dirty="0"/>
-              <a:t> OR name</a:t>
-            </a:r>
-          </a:p>
-          <a:p>
+              <a:t>All physical activity facilities not categorized as multi-use were considered either vigorous or light/moderate physical activity facilities.</a:t>
+            </a:r>
+          </a:p>
+          <a:p>
+            <a:r>
+              <a:rPr lang="en-US" dirty="0" smtClean="0"/>
+              <a:t>The Compendium of Physical Activity (Ainsworth et al., 2000) categorizes exercise intensity as vigorous or light/moderate based on MET values</a:t>
+            </a:r>
+          </a:p>
+          <a:p>
+            <a:pPr lvl="1"/>
+            <a:r>
+              <a:rPr lang="en-US" dirty="0" smtClean="0"/>
+              <a:t>We individually categorized all exercise facility SIC Codes that were not multi-use as vigorous and light/moderate based on these criteria and used them to create two mutually exclusive categories</a:t>
+            </a:r>
             <a:endParaRPr lang="en-US" dirty="0"/>
           </a:p>
         </p:txBody>
@@ -3385,20 +3253,13 @@
     </p:spTree>
     <p:extLst>
       <p:ext uri="{BB962C8B-B14F-4D97-AF65-F5344CB8AC3E}">
-        <p14:creationId xmlns:p14="http://schemas.microsoft.com/office/powerpoint/2010/main" val="2052377526"/>
+        <p14:creationId xmlns:p14="http://schemas.microsoft.com/office/powerpoint/2010/main" val="1147869298"/>
       </p:ext>
     </p:extLst>
   </p:cSld>
   <p:clrMapOvr>
     <a:masterClrMapping/>
   </p:clrMapOvr>
-  <p:timing>
-    <p:tnLst>
-      <p:par>
-        <p:cTn id="1" dur="indefinite" restart="never" nodeType="tmRoot"/>
-      </p:par>
-    </p:tnLst>
-  </p:timing>
 </p:sld>
 </file>
 
@@ -3419,70 +3280,6 @@
           <a:chExt cx="0" cy="0"/>
         </a:xfrm>
       </p:grpSpPr>
-      <p:pic>
-        <p:nvPicPr>
-          <p:cNvPr id="2051" name="Picture 3"/>
-          <p:cNvPicPr>
-            <a:picLocks noChangeAspect="1" noChangeArrowheads="1"/>
-          </p:cNvPicPr>
-          <p:nvPr/>
-        </p:nvPicPr>
-        <p:blipFill>
-          <a:blip r:embed="rId2">
-            <a:extLst>
-              <a:ext uri="{28A0092B-C50C-407E-A947-70E740481C1C}">
-                <a14:useLocalDpi xmlns:a14="http://schemas.microsoft.com/office/drawing/2010/main" val="0"/>
-              </a:ext>
-            </a:extLst>
-          </a:blip>
-          <a:srcRect/>
-          <a:stretch>
-            <a:fillRect/>
-          </a:stretch>
-        </p:blipFill>
-        <p:spPr bwMode="auto">
-          <a:xfrm>
-            <a:off x="4419600" y="1993106"/>
-            <a:ext cx="4435172" cy="3862388"/>
-          </a:xfrm>
-          <a:prstGeom prst="rect">
-            <a:avLst/>
-          </a:prstGeom>
-          <a:noFill/>
-          <a:ln>
-            <a:noFill/>
-          </a:ln>
-          <a:effectLst/>
-          <a:extLst>
-            <a:ext uri="{909E8E84-426E-40DD-AFC4-6F175D3DCCD1}">
-              <a14:hiddenFill xmlns:a14="http://schemas.microsoft.com/office/drawing/2010/main">
-                <a:solidFill>
-                  <a:schemeClr val="accent1"/>
-                </a:solidFill>
-              </a14:hiddenFill>
-            </a:ext>
-            <a:ext uri="{91240B29-F687-4F45-9708-019B960494DF}">
-              <a14:hiddenLine xmlns:a14="http://schemas.microsoft.com/office/drawing/2010/main" w="9525">
-                <a:solidFill>
-                  <a:schemeClr val="tx1"/>
-                </a:solidFill>
-                <a:miter lim="800000"/>
-                <a:headEnd/>
-                <a:tailEnd/>
-              </a14:hiddenLine>
-            </a:ext>
-            <a:ext uri="{AF507438-7753-43E0-B8FC-AC1667EBCBE1}">
-              <a14:hiddenEffects xmlns:a14="http://schemas.microsoft.com/office/drawing/2010/main">
-                <a:effectLst>
-                  <a:outerShdw dist="35921" dir="2700000" algn="ctr" rotWithShape="0">
-                    <a:schemeClr val="bg2"/>
-                  </a:outerShdw>
-                </a:effectLst>
-              </a14:hiddenEffects>
-            </a:ext>
-          </a:extLst>
-        </p:spPr>
-      </p:pic>
       <p:sp>
         <p:nvSpPr>
           <p:cNvPr id="2" name="Title 1"/>
@@ -3493,19 +3290,20 @@
             <p:ph type="title"/>
           </p:nvPr>
         </p:nvSpPr>
-        <p:spPr>
-          <a:xfrm>
-            <a:off x="531260" y="76200"/>
-            <a:ext cx="8229600" cy="1143000"/>
-          </a:xfrm>
-        </p:spPr>
-        <p:txBody>
-          <a:bodyPr/>
-          <a:lstStyle/>
-          <a:p>
-            <a:r>
-              <a:rPr lang="en-US" dirty="0" smtClean="0"/>
-              <a:t>Examining a Category</a:t>
+        <p:spPr/>
+        <p:txBody>
+          <a:bodyPr>
+            <a:normAutofit fontScale="90000"/>
+          </a:bodyPr>
+          <a:lstStyle/>
+          <a:p>
+            <a:r>
+              <a:rPr lang="en-US" dirty="0" smtClean="0"/>
+              <a:t>Categories Can be Simple:  </a:t>
+            </a:r>
+            <a:r>
+              <a:rPr lang="en-US" dirty="0" smtClean="0"/>
+              <a:t>Fish Markets</a:t>
             </a:r>
             <a:endParaRPr lang="en-US" dirty="0"/>
           </a:p>
@@ -3518,677 +3316,47 @@
             <a:spLocks noGrp="1"/>
           </p:cNvSpPr>
           <p:nvPr>
-            <p:ph sz="half" idx="1"/>
-          </p:nvPr>
-        </p:nvSpPr>
-        <p:spPr/>
-        <p:txBody>
-          <a:bodyPr/>
-          <a:lstStyle/>
-          <a:p>
-            <a:r>
-              <a:rPr lang="en-US" dirty="0" smtClean="0"/>
-              <a:t>Let’s look at Pizza again, in </a:t>
-            </a:r>
-            <a:r>
-              <a:rPr lang="en-US" dirty="0" err="1" smtClean="0"/>
-              <a:t>json_config.JSON</a:t>
-            </a:r>
-            <a:r>
-              <a:rPr lang="en-US" dirty="0" smtClean="0"/>
-              <a:t> (the only file we’ll be working with)</a:t>
-            </a:r>
-          </a:p>
-          <a:p>
-            <a:r>
-              <a:rPr lang="en-US" dirty="0" smtClean="0"/>
-              <a:t>Notice the “</a:t>
-            </a:r>
-            <a:r>
-              <a:rPr lang="en-US" dirty="0" err="1" smtClean="0"/>
-              <a:t>piz</a:t>
-            </a:r>
-            <a:r>
-              <a:rPr lang="en-US" dirty="0" smtClean="0"/>
-              <a:t>” object, and the other objects and arrays it contains</a:t>
+            <p:ph idx="1"/>
+          </p:nvPr>
+        </p:nvSpPr>
+        <p:spPr/>
+        <p:txBody>
+          <a:bodyPr/>
+          <a:lstStyle/>
+          <a:p>
+            <a:r>
+              <a:rPr lang="en-US" dirty="0" smtClean="0"/>
+              <a:t>While categorizations sometimes need to be complex to fit a researcher’s needs, simple categories based only on SIC codes are often sufficient</a:t>
+            </a:r>
+            <a:endParaRPr lang="en-US" dirty="0" smtClean="0"/>
+          </a:p>
+          <a:p>
+            <a:r>
+              <a:rPr lang="en-US" dirty="0" smtClean="0"/>
+              <a:t>A </a:t>
+            </a:r>
+            <a:r>
+              <a:rPr lang="en-US" dirty="0" smtClean="0"/>
+              <a:t>business can be categorized as a fish market if it meets the following criteria:</a:t>
             </a:r>
           </a:p>
           <a:p>
             <a:pPr lvl="1"/>
             <a:r>
               <a:rPr lang="en-US" dirty="0" smtClean="0"/>
-              <a:t>All categories don’t need all sub-objects.  If it’s not relevant, just leave it out</a:t>
-            </a:r>
+              <a:t>SIC code is in the range of 54210100:54210199</a:t>
+            </a:r>
+          </a:p>
+          <a:p>
+            <a:pPr lvl="1"/>
             <a:endParaRPr lang="en-US" dirty="0"/>
           </a:p>
         </p:txBody>
       </p:sp>
-      <p:cxnSp>
-        <p:nvCxnSpPr>
-          <p:cNvPr id="14" name="Straight Arrow Connector 13"/>
-          <p:cNvCxnSpPr>
-            <a:stCxn id="23" idx="2"/>
-          </p:cNvCxnSpPr>
-          <p:nvPr/>
-        </p:nvCxnSpPr>
-        <p:spPr>
-          <a:xfrm flipH="1">
-            <a:off x="6761679" y="3467100"/>
-            <a:ext cx="1020246" cy="266700"/>
-          </a:xfrm>
-          <a:prstGeom prst="straightConnector1">
-            <a:avLst/>
-          </a:prstGeom>
-          <a:ln w="28575">
-            <a:tailEnd type="arrow"/>
-          </a:ln>
-        </p:spPr>
-        <p:style>
-          <a:lnRef idx="1">
-            <a:schemeClr val="accent1"/>
-          </a:lnRef>
-          <a:fillRef idx="0">
-            <a:schemeClr val="accent1"/>
-          </a:fillRef>
-          <a:effectRef idx="0">
-            <a:schemeClr val="accent1"/>
-          </a:effectRef>
-          <a:fontRef idx="minor">
-            <a:schemeClr val="tx1"/>
-          </a:fontRef>
-        </p:style>
-      </p:cxnSp>
-      <p:cxnSp>
-        <p:nvCxnSpPr>
-          <p:cNvPr id="8" name="Straight Arrow Connector 7"/>
-          <p:cNvCxnSpPr/>
-          <p:nvPr/>
-        </p:nvCxnSpPr>
-        <p:spPr>
-          <a:xfrm flipH="1">
-            <a:off x="5195887" y="1774031"/>
-            <a:ext cx="428625" cy="352425"/>
-          </a:xfrm>
-          <a:prstGeom prst="straightConnector1">
-            <a:avLst/>
-          </a:prstGeom>
-          <a:ln w="28575">
-            <a:tailEnd type="arrow"/>
-          </a:ln>
-        </p:spPr>
-        <p:style>
-          <a:lnRef idx="1">
-            <a:schemeClr val="accent1"/>
-          </a:lnRef>
-          <a:fillRef idx="0">
-            <a:schemeClr val="accent1"/>
-          </a:fillRef>
-          <a:effectRef idx="0">
-            <a:schemeClr val="accent1"/>
-          </a:effectRef>
-          <a:fontRef idx="minor">
-            <a:schemeClr val="tx1"/>
-          </a:fontRef>
-        </p:style>
-      </p:cxnSp>
-      <p:cxnSp>
-        <p:nvCxnSpPr>
-          <p:cNvPr id="10" name="Straight Arrow Connector 9"/>
-          <p:cNvCxnSpPr/>
-          <p:nvPr/>
-        </p:nvCxnSpPr>
-        <p:spPr>
-          <a:xfrm flipH="1">
-            <a:off x="5762625" y="1669256"/>
-            <a:ext cx="952500" cy="609600"/>
-          </a:xfrm>
-          <a:prstGeom prst="straightConnector1">
-            <a:avLst/>
-          </a:prstGeom>
-          <a:ln w="28575">
-            <a:tailEnd type="arrow"/>
-          </a:ln>
-        </p:spPr>
-        <p:style>
-          <a:lnRef idx="1">
-            <a:schemeClr val="accent1"/>
-          </a:lnRef>
-          <a:fillRef idx="0">
-            <a:schemeClr val="accent1"/>
-          </a:fillRef>
-          <a:effectRef idx="0">
-            <a:schemeClr val="accent1"/>
-          </a:effectRef>
-          <a:fontRef idx="minor">
-            <a:schemeClr val="tx1"/>
-          </a:fontRef>
-        </p:style>
-      </p:cxnSp>
-      <p:cxnSp>
-        <p:nvCxnSpPr>
-          <p:cNvPr id="12" name="Straight Arrow Connector 11"/>
-          <p:cNvCxnSpPr/>
-          <p:nvPr/>
-        </p:nvCxnSpPr>
-        <p:spPr>
-          <a:xfrm flipH="1">
-            <a:off x="6715125" y="1866900"/>
-            <a:ext cx="800100" cy="647700"/>
-          </a:xfrm>
-          <a:prstGeom prst="straightConnector1">
-            <a:avLst/>
-          </a:prstGeom>
-          <a:ln w="28575">
-            <a:tailEnd type="arrow"/>
-          </a:ln>
-        </p:spPr>
-        <p:style>
-          <a:lnRef idx="1">
-            <a:schemeClr val="accent1"/>
-          </a:lnRef>
-          <a:fillRef idx="0">
-            <a:schemeClr val="accent1"/>
-          </a:fillRef>
-          <a:effectRef idx="0">
-            <a:schemeClr val="accent1"/>
-          </a:effectRef>
-          <a:fontRef idx="minor">
-            <a:schemeClr val="tx1"/>
-          </a:fontRef>
-        </p:style>
-      </p:cxnSp>
-      <p:cxnSp>
-        <p:nvCxnSpPr>
-          <p:cNvPr id="16" name="Straight Arrow Connector 15"/>
-          <p:cNvCxnSpPr>
-            <a:stCxn id="24" idx="2"/>
-          </p:cNvCxnSpPr>
-          <p:nvPr/>
-        </p:nvCxnSpPr>
-        <p:spPr>
-          <a:xfrm flipH="1">
-            <a:off x="5591175" y="4185047"/>
-            <a:ext cx="2190750" cy="929878"/>
-          </a:xfrm>
-          <a:prstGeom prst="straightConnector1">
-            <a:avLst/>
-          </a:prstGeom>
-          <a:ln w="28575">
-            <a:tailEnd type="arrow"/>
-          </a:ln>
-        </p:spPr>
-        <p:style>
-          <a:lnRef idx="1">
-            <a:schemeClr val="accent1"/>
-          </a:lnRef>
-          <a:fillRef idx="0">
-            <a:schemeClr val="accent1"/>
-          </a:fillRef>
-          <a:effectRef idx="0">
-            <a:schemeClr val="accent1"/>
-          </a:effectRef>
-          <a:fontRef idx="minor">
-            <a:schemeClr val="tx1"/>
-          </a:fontRef>
-        </p:style>
-      </p:cxnSp>
-      <p:cxnSp>
-        <p:nvCxnSpPr>
-          <p:cNvPr id="18" name="Straight Arrow Connector 17"/>
-          <p:cNvCxnSpPr/>
-          <p:nvPr/>
-        </p:nvCxnSpPr>
-        <p:spPr>
-          <a:xfrm flipH="1">
-            <a:off x="5838825" y="4953000"/>
-            <a:ext cx="2057400" cy="419100"/>
-          </a:xfrm>
-          <a:prstGeom prst="straightConnector1">
-            <a:avLst/>
-          </a:prstGeom>
-          <a:ln w="28575">
-            <a:tailEnd type="arrow"/>
-          </a:ln>
-        </p:spPr>
-        <p:style>
-          <a:lnRef idx="1">
-            <a:schemeClr val="accent1"/>
-          </a:lnRef>
-          <a:fillRef idx="0">
-            <a:schemeClr val="accent1"/>
-          </a:fillRef>
-          <a:effectRef idx="0">
-            <a:schemeClr val="accent1"/>
-          </a:effectRef>
-          <a:fontRef idx="minor">
-            <a:schemeClr val="tx1"/>
-          </a:fontRef>
-        </p:style>
-      </p:cxnSp>
-      <p:sp>
-        <p:nvSpPr>
-          <p:cNvPr id="19" name="Rectangle 18"/>
-          <p:cNvSpPr/>
-          <p:nvPr/>
-        </p:nvSpPr>
-        <p:spPr>
-          <a:xfrm>
-            <a:off x="5438775" y="1400175"/>
-            <a:ext cx="800100" cy="381000"/>
-          </a:xfrm>
-          <a:prstGeom prst="rect">
-            <a:avLst/>
-          </a:prstGeom>
-        </p:spPr>
-        <p:style>
-          <a:lnRef idx="2">
-            <a:schemeClr val="accent1">
-              <a:shade val="50000"/>
-            </a:schemeClr>
-          </a:lnRef>
-          <a:fillRef idx="1">
-            <a:schemeClr val="accent1"/>
-          </a:fillRef>
-          <a:effectRef idx="0">
-            <a:schemeClr val="accent1"/>
-          </a:effectRef>
-          <a:fontRef idx="minor">
-            <a:schemeClr val="lt1"/>
-          </a:fontRef>
-        </p:style>
-        <p:txBody>
-          <a:bodyPr rtlCol="0" anchor="ctr"/>
-          <a:lstStyle/>
-          <a:p>
-            <a:pPr algn="ctr"/>
-            <a:r>
-              <a:rPr lang="en-US" sz="1200" dirty="0" smtClean="0"/>
-              <a:t>Opening bracket</a:t>
-            </a:r>
-            <a:endParaRPr lang="en-US" sz="1200" dirty="0"/>
-          </a:p>
-        </p:txBody>
-      </p:sp>
-      <p:sp>
-        <p:nvSpPr>
-          <p:cNvPr id="21" name="Rectangle 20"/>
-          <p:cNvSpPr/>
-          <p:nvPr/>
-        </p:nvSpPr>
-        <p:spPr>
-          <a:xfrm>
-            <a:off x="6315075" y="1295400"/>
-            <a:ext cx="800100" cy="381000"/>
-          </a:xfrm>
-          <a:prstGeom prst="rect">
-            <a:avLst/>
-          </a:prstGeom>
-        </p:spPr>
-        <p:style>
-          <a:lnRef idx="2">
-            <a:schemeClr val="accent1">
-              <a:shade val="50000"/>
-            </a:schemeClr>
-          </a:lnRef>
-          <a:fillRef idx="1">
-            <a:schemeClr val="accent1"/>
-          </a:fillRef>
-          <a:effectRef idx="0">
-            <a:schemeClr val="accent1"/>
-          </a:effectRef>
-          <a:fontRef idx="minor">
-            <a:schemeClr val="lt1"/>
-          </a:fontRef>
-        </p:style>
-        <p:txBody>
-          <a:bodyPr rtlCol="0" anchor="ctr"/>
-          <a:lstStyle/>
-          <a:p>
-            <a:pPr algn="ctr"/>
-            <a:r>
-              <a:rPr lang="en-US" sz="1200" dirty="0" smtClean="0"/>
-              <a:t>Category name</a:t>
-            </a:r>
-            <a:endParaRPr lang="en-US" sz="1200" dirty="0"/>
-          </a:p>
-        </p:txBody>
-      </p:sp>
-      <p:sp>
-        <p:nvSpPr>
-          <p:cNvPr id="22" name="Rectangle 21"/>
-          <p:cNvSpPr/>
-          <p:nvPr/>
-        </p:nvSpPr>
-        <p:spPr>
-          <a:xfrm>
-            <a:off x="7134225" y="1564481"/>
-            <a:ext cx="800100" cy="381000"/>
-          </a:xfrm>
-          <a:prstGeom prst="rect">
-            <a:avLst/>
-          </a:prstGeom>
-        </p:spPr>
-        <p:style>
-          <a:lnRef idx="2">
-            <a:schemeClr val="accent1">
-              <a:shade val="50000"/>
-            </a:schemeClr>
-          </a:lnRef>
-          <a:fillRef idx="1">
-            <a:schemeClr val="accent1"/>
-          </a:fillRef>
-          <a:effectRef idx="0">
-            <a:schemeClr val="accent1"/>
-          </a:effectRef>
-          <a:fontRef idx="minor">
-            <a:schemeClr val="lt1"/>
-          </a:fontRef>
-        </p:style>
-        <p:txBody>
-          <a:bodyPr rtlCol="0" anchor="ctr"/>
-          <a:lstStyle/>
-          <a:p>
-            <a:pPr algn="ctr"/>
-            <a:r>
-              <a:rPr lang="en-US" sz="1200" dirty="0" smtClean="0"/>
-              <a:t>Array</a:t>
-            </a:r>
-            <a:endParaRPr lang="en-US" sz="1200" dirty="0"/>
-          </a:p>
-        </p:txBody>
-      </p:sp>
-      <p:sp>
-        <p:nvSpPr>
-          <p:cNvPr id="23" name="Rectangle 22"/>
-          <p:cNvSpPr/>
-          <p:nvPr/>
-        </p:nvSpPr>
-        <p:spPr>
-          <a:xfrm>
-            <a:off x="7105650" y="2667000"/>
-            <a:ext cx="1352550" cy="800100"/>
-          </a:xfrm>
-          <a:prstGeom prst="rect">
-            <a:avLst/>
-          </a:prstGeom>
-        </p:spPr>
-        <p:style>
-          <a:lnRef idx="2">
-            <a:schemeClr val="accent1">
-              <a:shade val="50000"/>
-            </a:schemeClr>
-          </a:lnRef>
-          <a:fillRef idx="1">
-            <a:schemeClr val="accent1"/>
-          </a:fillRef>
-          <a:effectRef idx="0">
-            <a:schemeClr val="accent1"/>
-          </a:effectRef>
-          <a:fontRef idx="minor">
-            <a:schemeClr val="lt1"/>
-          </a:fontRef>
-        </p:style>
-        <p:txBody>
-          <a:bodyPr rtlCol="0" anchor="ctr"/>
-          <a:lstStyle/>
-          <a:p>
-            <a:pPr algn="ctr"/>
-            <a:r>
-              <a:rPr lang="en-US" sz="1200" dirty="0" smtClean="0"/>
-              <a:t>Represents two ranges: (5411:5499), (58120,:58129)</a:t>
-            </a:r>
-            <a:endParaRPr lang="en-US" sz="1200" dirty="0"/>
-          </a:p>
-        </p:txBody>
-      </p:sp>
-      <p:sp>
-        <p:nvSpPr>
-          <p:cNvPr id="24" name="Rectangle 23"/>
-          <p:cNvSpPr/>
-          <p:nvPr/>
-        </p:nvSpPr>
-        <p:spPr>
-          <a:xfrm>
-            <a:off x="7233702" y="3663553"/>
-            <a:ext cx="1096446" cy="521494"/>
-          </a:xfrm>
-          <a:prstGeom prst="rect">
-            <a:avLst/>
-          </a:prstGeom>
-        </p:spPr>
-        <p:style>
-          <a:lnRef idx="2">
-            <a:schemeClr val="accent1">
-              <a:shade val="50000"/>
-            </a:schemeClr>
-          </a:lnRef>
-          <a:fillRef idx="1">
-            <a:schemeClr val="accent1"/>
-          </a:fillRef>
-          <a:effectRef idx="0">
-            <a:schemeClr val="accent1"/>
-          </a:effectRef>
-          <a:fontRef idx="minor">
-            <a:schemeClr val="lt1"/>
-          </a:fontRef>
-        </p:style>
-        <p:txBody>
-          <a:bodyPr rtlCol="0" anchor="ctr"/>
-          <a:lstStyle/>
-          <a:p>
-            <a:pPr algn="ctr"/>
-            <a:r>
-              <a:rPr lang="en-US" sz="1200" dirty="0" smtClean="0"/>
-              <a:t>Closing Bracket ends category</a:t>
-            </a:r>
-            <a:endParaRPr lang="en-US" sz="1200" dirty="0"/>
-          </a:p>
-        </p:txBody>
-      </p:sp>
-      <p:sp>
-        <p:nvSpPr>
-          <p:cNvPr id="25" name="Rectangle 24"/>
-          <p:cNvSpPr/>
-          <p:nvPr/>
-        </p:nvSpPr>
-        <p:spPr>
-          <a:xfrm>
-            <a:off x="7496175" y="4572000"/>
-            <a:ext cx="800100" cy="381000"/>
-          </a:xfrm>
-          <a:prstGeom prst="rect">
-            <a:avLst/>
-          </a:prstGeom>
-        </p:spPr>
-        <p:style>
-          <a:lnRef idx="2">
-            <a:schemeClr val="accent1">
-              <a:shade val="50000"/>
-            </a:schemeClr>
-          </a:lnRef>
-          <a:fillRef idx="1">
-            <a:schemeClr val="accent1"/>
-          </a:fillRef>
-          <a:effectRef idx="0">
-            <a:schemeClr val="accent1"/>
-          </a:effectRef>
-          <a:fontRef idx="minor">
-            <a:schemeClr val="lt1"/>
-          </a:fontRef>
-        </p:style>
-        <p:txBody>
-          <a:bodyPr rtlCol="0" anchor="ctr"/>
-          <a:lstStyle/>
-          <a:p>
-            <a:pPr algn="ctr"/>
-            <a:r>
-              <a:rPr lang="en-US" sz="1200" dirty="0" smtClean="0"/>
-              <a:t>Next category</a:t>
-            </a:r>
-            <a:endParaRPr lang="en-US" sz="1200" dirty="0"/>
-          </a:p>
-        </p:txBody>
-      </p:sp>
-      <p:cxnSp>
-        <p:nvCxnSpPr>
-          <p:cNvPr id="2054" name="Straight Arrow Connector 2053"/>
-          <p:cNvCxnSpPr/>
-          <p:nvPr/>
-        </p:nvCxnSpPr>
-        <p:spPr>
-          <a:xfrm flipH="1" flipV="1">
-            <a:off x="6934200" y="4762500"/>
-            <a:ext cx="457200" cy="1257300"/>
-          </a:xfrm>
-          <a:prstGeom prst="straightConnector1">
-            <a:avLst/>
-          </a:prstGeom>
-          <a:ln w="28575">
-            <a:tailEnd type="arrow"/>
-          </a:ln>
-        </p:spPr>
-        <p:style>
-          <a:lnRef idx="1">
-            <a:schemeClr val="accent1"/>
-          </a:lnRef>
-          <a:fillRef idx="0">
-            <a:schemeClr val="accent1"/>
-          </a:fillRef>
-          <a:effectRef idx="0">
-            <a:schemeClr val="accent1"/>
-          </a:effectRef>
-          <a:fontRef idx="minor">
-            <a:schemeClr val="tx1"/>
-          </a:fontRef>
-        </p:style>
-      </p:cxnSp>
-      <p:sp>
-        <p:nvSpPr>
-          <p:cNvPr id="2055" name="Rectangle 2054"/>
-          <p:cNvSpPr/>
-          <p:nvPr/>
-        </p:nvSpPr>
-        <p:spPr>
-          <a:xfrm>
-            <a:off x="6477000" y="5943600"/>
-            <a:ext cx="2514600" cy="838200"/>
-          </a:xfrm>
-          <a:prstGeom prst="rect">
-            <a:avLst/>
-          </a:prstGeom>
-        </p:spPr>
-        <p:style>
-          <a:lnRef idx="2">
-            <a:schemeClr val="accent1">
-              <a:shade val="50000"/>
-            </a:schemeClr>
-          </a:lnRef>
-          <a:fillRef idx="1">
-            <a:schemeClr val="accent1"/>
-          </a:fillRef>
-          <a:effectRef idx="0">
-            <a:schemeClr val="accent1"/>
-          </a:effectRef>
-          <a:fontRef idx="minor">
-            <a:schemeClr val="lt1"/>
-          </a:fontRef>
-        </p:style>
-        <p:txBody>
-          <a:bodyPr rtlCol="0" anchor="ctr"/>
-          <a:lstStyle/>
-          <a:p>
-            <a:pPr algn="ctr"/>
-            <a:r>
-              <a:rPr lang="en-US" sz="1200" dirty="0" smtClean="0"/>
-              <a:t>Tells the code how to evaluate the business against the category.  Numbers correspond to those in the previous slide</a:t>
-            </a:r>
-            <a:endParaRPr lang="en-US" sz="1200" dirty="0"/>
-          </a:p>
-        </p:txBody>
-      </p:sp>
-      <p:sp>
-        <p:nvSpPr>
-          <p:cNvPr id="2056" name="Rectangle 2055"/>
-          <p:cNvSpPr/>
-          <p:nvPr/>
-        </p:nvSpPr>
-        <p:spPr>
-          <a:xfrm>
-            <a:off x="7934325" y="5299472"/>
-            <a:ext cx="910173" cy="469106"/>
-          </a:xfrm>
-          <a:prstGeom prst="rect">
-            <a:avLst/>
-          </a:prstGeom>
-        </p:spPr>
-        <p:style>
-          <a:lnRef idx="2">
-            <a:schemeClr val="accent1">
-              <a:shade val="50000"/>
-            </a:schemeClr>
-          </a:lnRef>
-          <a:fillRef idx="1">
-            <a:schemeClr val="accent1"/>
-          </a:fillRef>
-          <a:effectRef idx="0">
-            <a:schemeClr val="accent1"/>
-          </a:effectRef>
-          <a:fontRef idx="minor">
-            <a:schemeClr val="lt1"/>
-          </a:fontRef>
-        </p:style>
-        <p:txBody>
-          <a:bodyPr rtlCol="0" anchor="ctr"/>
-          <a:lstStyle/>
-          <a:p>
-            <a:pPr algn="ctr"/>
-            <a:r>
-              <a:rPr lang="en-US" sz="1200" dirty="0" smtClean="0"/>
-              <a:t>Ignore </a:t>
-            </a:r>
-            <a:endParaRPr lang="en-US" sz="1200" dirty="0"/>
-          </a:p>
-        </p:txBody>
-      </p:sp>
-      <p:cxnSp>
-        <p:nvCxnSpPr>
-          <p:cNvPr id="2058" name="Straight Arrow Connector 2057"/>
-          <p:cNvCxnSpPr>
-            <a:stCxn id="2056" idx="0"/>
-          </p:cNvCxnSpPr>
-          <p:nvPr/>
-        </p:nvCxnSpPr>
-        <p:spPr>
-          <a:xfrm flipH="1" flipV="1">
-            <a:off x="6477000" y="4953000"/>
-            <a:ext cx="1912412" cy="346472"/>
-          </a:xfrm>
-          <a:prstGeom prst="straightConnector1">
-            <a:avLst/>
-          </a:prstGeom>
-          <a:ln w="28575">
-            <a:tailEnd type="arrow"/>
-          </a:ln>
-        </p:spPr>
-        <p:style>
-          <a:lnRef idx="1">
-            <a:schemeClr val="accent1"/>
-          </a:lnRef>
-          <a:fillRef idx="0">
-            <a:schemeClr val="accent1"/>
-          </a:fillRef>
-          <a:effectRef idx="0">
-            <a:schemeClr val="accent1"/>
-          </a:effectRef>
-          <a:fontRef idx="minor">
-            <a:schemeClr val="tx1"/>
-          </a:fontRef>
-        </p:style>
-      </p:cxnSp>
     </p:spTree>
     <p:extLst>
       <p:ext uri="{BB962C8B-B14F-4D97-AF65-F5344CB8AC3E}">
-        <p14:creationId xmlns:p14="http://schemas.microsoft.com/office/powerpoint/2010/main" val="3455808461"/>
+        <p14:creationId xmlns:p14="http://schemas.microsoft.com/office/powerpoint/2010/main" val="3727555106"/>
       </p:ext>
     </p:extLst>
   </p:cSld>
@@ -4224,7 +3392,7 @@
       </p:grpSpPr>
       <p:sp>
         <p:nvSpPr>
-          <p:cNvPr id="5" name="Title 4"/>
+          <p:cNvPr id="2" name="Title 1"/>
           <p:cNvSpPr>
             <a:spLocks noGrp="1"/>
           </p:cNvSpPr>
@@ -4239,7 +3407,7 @@
           <a:p>
             <a:r>
               <a:rPr lang="en-US" dirty="0" smtClean="0"/>
-              <a:t>Writing a New Category</a:t>
+              <a:t>Aggregate Retail Categories</a:t>
             </a:r>
             <a:endParaRPr lang="en-US" dirty="0"/>
           </a:p>
@@ -4247,7 +3415,7 @@
       </p:sp>
       <p:sp>
         <p:nvSpPr>
-          <p:cNvPr id="6" name="Content Placeholder 5"/>
+          <p:cNvPr id="3" name="Content Placeholder 2"/>
           <p:cNvSpPr>
             <a:spLocks noGrp="1"/>
           </p:cNvSpPr>
@@ -4257,35 +3425,25 @@
         </p:nvSpPr>
         <p:spPr/>
         <p:txBody>
-          <a:bodyPr>
-            <a:normAutofit lnSpcReduction="10000"/>
-          </a:bodyPr>
-          <a:lstStyle/>
-          <a:p>
-            <a:r>
-              <a:rPr lang="en-US" dirty="0" smtClean="0"/>
-              <a:t>New custom categories can easily be added if they are evaluated in the same manner as one of the existing conditionals, using the existing true/false questions</a:t>
-            </a:r>
-          </a:p>
-          <a:p>
-            <a:r>
-              <a:rPr lang="en-US" dirty="0" smtClean="0"/>
-              <a:t>If you wish to base a category on a </a:t>
-            </a:r>
-            <a:r>
-              <a:rPr lang="en-US" i="1" dirty="0" smtClean="0"/>
-              <a:t>new</a:t>
-            </a:r>
-            <a:r>
-              <a:rPr lang="en-US" dirty="0" smtClean="0"/>
-              <a:t> conditional, this must be done by modifying the Python source code</a:t>
+          <a:bodyPr/>
+          <a:lstStyle/>
+          <a:p>
+            <a:r>
+              <a:rPr lang="en-US" dirty="0" smtClean="0"/>
+              <a:t>While specific categories are useful, sometimes we need to look at things more broadly</a:t>
+            </a:r>
+          </a:p>
+          <a:p>
+            <a:r>
+              <a:rPr lang="en-US" dirty="0" smtClean="0"/>
+              <a:t>Aggregate retail categories are broader and capture a number of more specific categories within them</a:t>
             </a:r>
           </a:p>
           <a:p>
             <a:pPr lvl="1"/>
             <a:r>
               <a:rPr lang="en-US" dirty="0" smtClean="0"/>
-              <a:t>For the purpose of this tutorial, we will assume you are using an existing conditional and true/false questions</a:t>
+              <a:t>Example: The unhealthy food sources category includes: fast food, pizza, bakeries, meat markets, convenience stores, and bodegas</a:t>
             </a:r>
             <a:endParaRPr lang="en-US" dirty="0"/>
           </a:p>
@@ -4294,182 +3452,13 @@
     </p:spTree>
     <p:extLst>
       <p:ext uri="{BB962C8B-B14F-4D97-AF65-F5344CB8AC3E}">
-        <p14:creationId xmlns:p14="http://schemas.microsoft.com/office/powerpoint/2010/main" val="3781220595"/>
+        <p14:creationId xmlns:p14="http://schemas.microsoft.com/office/powerpoint/2010/main" val="3661271134"/>
       </p:ext>
     </p:extLst>
   </p:cSld>
   <p:clrMapOvr>
     <a:masterClrMapping/>
   </p:clrMapOvr>
-  <p:timing>
-    <p:tnLst>
-      <p:par>
-        <p:cTn id="1" dur="indefinite" restart="never" nodeType="tmRoot"/>
-      </p:par>
-    </p:tnLst>
-  </p:timing>
-</p:sld>
-</file>
-
-<file path=ppt/slides/slide13.xml><?xml version="1.0" encoding="utf-8"?>
-<p:sld xmlns:a="http://schemas.openxmlformats.org/drawingml/2006/main" xmlns:r="http://schemas.openxmlformats.org/officeDocument/2006/relationships" xmlns:p="http://schemas.openxmlformats.org/presentationml/2006/main">
-  <p:cSld>
-    <p:spTree>
-      <p:nvGrpSpPr>
-        <p:cNvPr id="1" name=""/>
-        <p:cNvGrpSpPr/>
-        <p:nvPr/>
-      </p:nvGrpSpPr>
-      <p:grpSpPr>
-        <a:xfrm>
-          <a:off x="0" y="0"/>
-          <a:ext cx="0" cy="0"/>
-          <a:chOff x="0" y="0"/>
-          <a:chExt cx="0" cy="0"/>
-        </a:xfrm>
-      </p:grpSpPr>
-      <p:sp>
-        <p:nvSpPr>
-          <p:cNvPr id="2" name="Title 1"/>
-          <p:cNvSpPr>
-            <a:spLocks noGrp="1"/>
-          </p:cNvSpPr>
-          <p:nvPr>
-            <p:ph type="title"/>
-          </p:nvPr>
-        </p:nvSpPr>
-        <p:spPr/>
-        <p:txBody>
-          <a:bodyPr/>
-          <a:lstStyle/>
-          <a:p>
-            <a:r>
-              <a:rPr lang="en-US" dirty="0" smtClean="0"/>
-              <a:t>Writing a New Category</a:t>
-            </a:r>
-            <a:endParaRPr lang="en-US" dirty="0"/>
-          </a:p>
-        </p:txBody>
-      </p:sp>
-      <p:sp>
-        <p:nvSpPr>
-          <p:cNvPr id="3" name="Content Placeholder 2"/>
-          <p:cNvSpPr>
-            <a:spLocks noGrp="1"/>
-          </p:cNvSpPr>
-          <p:nvPr>
-            <p:ph idx="1"/>
-          </p:nvPr>
-        </p:nvSpPr>
-        <p:spPr>
-          <a:xfrm>
-            <a:off x="457200" y="1371600"/>
-            <a:ext cx="8229600" cy="5334000"/>
-          </a:xfrm>
-        </p:spPr>
-        <p:txBody>
-          <a:bodyPr>
-            <a:normAutofit fontScale="85000" lnSpcReduction="20000"/>
-          </a:bodyPr>
-          <a:lstStyle/>
-          <a:p>
-            <a:pPr marL="514350" indent="-514350">
-              <a:buFont typeface="+mj-lt"/>
-              <a:buAutoNum type="arabicPeriod"/>
-            </a:pPr>
-            <a:r>
-              <a:rPr lang="en-US" dirty="0" smtClean="0"/>
-              <a:t>It’s easy!  First, develop the rules that define your category and which conditional they fit</a:t>
-            </a:r>
-          </a:p>
-          <a:p>
-            <a:pPr marL="514350" indent="-514350">
-              <a:buFont typeface="+mj-lt"/>
-              <a:buAutoNum type="arabicPeriod"/>
-            </a:pPr>
-            <a:r>
-              <a:rPr lang="en-US" dirty="0"/>
-              <a:t>O</a:t>
-            </a:r>
-            <a:r>
-              <a:rPr lang="en-US" dirty="0" smtClean="0"/>
-              <a:t>pen </a:t>
-            </a:r>
-            <a:r>
-              <a:rPr lang="en-US" dirty="0" err="1" smtClean="0"/>
-              <a:t>json_config.JSON</a:t>
-            </a:r>
-            <a:r>
-              <a:rPr lang="en-US" dirty="0" smtClean="0"/>
-              <a:t> in either Notepad++ or your browser</a:t>
-            </a:r>
-          </a:p>
-          <a:p>
-            <a:pPr marL="514350" indent="-514350">
-              <a:buFont typeface="+mj-lt"/>
-              <a:buAutoNum type="arabicPeriod"/>
-            </a:pPr>
-            <a:r>
-              <a:rPr lang="en-US" dirty="0" smtClean="0"/>
-              <a:t>Order is irrelevant in JSON, you may put the new object at any point in the file</a:t>
-            </a:r>
-          </a:p>
-          <a:p>
-            <a:pPr marL="514350" indent="-514350">
-              <a:buFont typeface="+mj-lt"/>
-              <a:buAutoNum type="arabicPeriod"/>
-            </a:pPr>
-            <a:r>
-              <a:rPr lang="en-US" dirty="0" smtClean="0"/>
-              <a:t>Input all the true/false conditions relevant to your category, and its conditional type</a:t>
-            </a:r>
-          </a:p>
-          <a:p>
-            <a:pPr lvl="1"/>
-            <a:r>
-              <a:rPr lang="en-US" dirty="0" smtClean="0"/>
-              <a:t>Remember, Objects are enclosed in curly brackets.  Arrays are enclosed in square brackets.  Values are separated by commas.  </a:t>
-            </a:r>
-          </a:p>
-          <a:p>
-            <a:pPr lvl="1"/>
-            <a:r>
-              <a:rPr lang="en-US" dirty="0" smtClean="0"/>
-              <a:t>Your JSON editor will be able to check your file for syntax errors</a:t>
-            </a:r>
-          </a:p>
-          <a:p>
-            <a:pPr marL="514350" indent="-514350">
-              <a:buFont typeface="+mj-lt"/>
-              <a:buAutoNum type="arabicPeriod"/>
-            </a:pPr>
-            <a:r>
-              <a:rPr lang="en-US" dirty="0" smtClean="0"/>
-              <a:t>Save, and that’s it!  The wrangling code now includes your category</a:t>
-            </a:r>
-          </a:p>
-          <a:p>
-            <a:endParaRPr lang="en-US" dirty="0"/>
-          </a:p>
-        </p:txBody>
-      </p:sp>
-    </p:spTree>
-    <p:extLst>
-      <p:ext uri="{BB962C8B-B14F-4D97-AF65-F5344CB8AC3E}">
-        <p14:creationId xmlns:p14="http://schemas.microsoft.com/office/powerpoint/2010/main" val="3560757873"/>
-      </p:ext>
-    </p:extLst>
-  </p:cSld>
-  <p:clrMapOvr>
-    <a:masterClrMapping/>
-  </p:clrMapOvr>
-  <p:timing>
-    <p:tnLst>
-      <p:par>
-        <p:cTn id="1" dur="indefinite" restart="never" nodeType="tmRoot"/>
-      </p:par>
-    </p:tnLst>
-  </p:timing>
 </p:sld>
 </file>
 
@@ -4502,12 +3491,14 @@
         </p:nvSpPr>
         <p:spPr/>
         <p:txBody>
-          <a:bodyPr/>
-          <a:lstStyle/>
-          <a:p>
-            <a:r>
-              <a:rPr lang="en-US" dirty="0" smtClean="0"/>
-              <a:t>Category Background</a:t>
+          <a:bodyPr>
+            <a:normAutofit/>
+          </a:bodyPr>
+          <a:lstStyle/>
+          <a:p>
+            <a:r>
+              <a:rPr lang="en-US" dirty="0" smtClean="0"/>
+              <a:t>Business Categorization with NETS</a:t>
             </a:r>
             <a:endParaRPr lang="en-US" dirty="0"/>
           </a:p>
@@ -4526,29 +3517,38 @@
         <p:spPr/>
         <p:txBody>
           <a:bodyPr>
-            <a:normAutofit fontScale="92500"/>
+            <a:normAutofit fontScale="92500" lnSpcReduction="10000"/>
           </a:bodyPr>
           <a:lstStyle/>
           <a:p>
             <a:r>
               <a:rPr lang="en-US" dirty="0" smtClean="0"/>
-              <a:t>NETS uses Standard Industrial Classification (SIC) codes as their native measure of business classification</a:t>
-            </a:r>
-          </a:p>
-          <a:p>
-            <a:r>
-              <a:rPr lang="en-US" dirty="0" smtClean="0"/>
-              <a:t>It is often desirable to create business classes that go beyond what is described in SIC code (business name, number of employees, annual sales)</a:t>
-            </a:r>
-          </a:p>
-          <a:p>
-            <a:r>
-              <a:rPr lang="en-US" dirty="0" smtClean="0"/>
-              <a:t>We have </a:t>
-            </a:r>
-            <a:r>
-              <a:rPr lang="en-US" dirty="0" smtClean="0"/>
-              <a:t>created a custom system of business categorization based on a number of different factors</a:t>
+              <a:t>NETS uses Standard Industrial Classification (SIC) codes as their native measure of business </a:t>
+            </a:r>
+            <a:r>
+              <a:rPr lang="en-US" dirty="0" smtClean="0"/>
+              <a:t>categorization</a:t>
+            </a:r>
+            <a:endParaRPr lang="en-US" dirty="0" smtClean="0"/>
+          </a:p>
+          <a:p>
+            <a:r>
+              <a:rPr lang="en-US" dirty="0" smtClean="0"/>
+              <a:t>It is often desirable to create business </a:t>
+            </a:r>
+            <a:r>
+              <a:rPr lang="en-US" dirty="0" smtClean="0"/>
+              <a:t>categories that </a:t>
+            </a:r>
+            <a:r>
+              <a:rPr lang="en-US" dirty="0" smtClean="0"/>
+              <a:t>go beyond what is described in SIC code (business name, number of employees, annual sales)</a:t>
+            </a:r>
+          </a:p>
+          <a:p>
+            <a:r>
+              <a:rPr lang="en-US" dirty="0" smtClean="0"/>
+              <a:t>We have created a custom system of business categorization based on a number of different factors</a:t>
             </a:r>
           </a:p>
         </p:txBody>
@@ -4607,7 +3607,7 @@
           <a:p>
             <a:r>
               <a:rPr lang="en-US" dirty="0" smtClean="0"/>
-              <a:t>Category Example: Pizza</a:t>
+              <a:t>Categories:  Important to Note</a:t>
             </a:r>
             <a:endParaRPr lang="en-US" dirty="0"/>
           </a:p>
@@ -4622,52 +3622,59 @@
           <p:nvPr>
             <p:ph idx="1"/>
           </p:nvPr>
+        </p:nvSpPr>
+        <p:spPr/>
+        <p:txBody>
+          <a:bodyPr/>
+          <a:lstStyle/>
+          <a:p>
+            <a:r>
+              <a:rPr lang="en-US" dirty="0" smtClean="0"/>
+              <a:t>Categories can be built on a variety of criteria, and can be straightforward SIC code classifications or include other more complex criteria</a:t>
+            </a:r>
+          </a:p>
+          <a:p>
+            <a:r>
+              <a:rPr lang="en-US" dirty="0" smtClean="0"/>
+              <a:t>Our native categories are not mutually exclusive by </a:t>
+            </a:r>
+            <a:r>
+              <a:rPr lang="en-US" dirty="0" smtClean="0"/>
+              <a:t>nature*; </a:t>
+            </a:r>
+            <a:r>
+              <a:rPr lang="en-US" dirty="0" smtClean="0"/>
+              <a:t>a business can fit in more than one category</a:t>
+            </a:r>
+            <a:endParaRPr lang="en-US" dirty="0"/>
+          </a:p>
+        </p:txBody>
+      </p:sp>
+      <p:sp>
+        <p:nvSpPr>
+          <p:cNvPr id="4" name="TextBox 3"/>
+          <p:cNvSpPr txBox="1"/>
+          <p:nvPr/>
         </p:nvSpPr>
         <p:spPr>
           <a:xfrm>
-            <a:off x="228600" y="1600200"/>
-            <a:ext cx="8534400" cy="4525963"/>
+            <a:off x="228600" y="6400800"/>
+            <a:ext cx="4419600" cy="369332"/>
           </a:xfrm>
+          <a:prstGeom prst="rect">
+            <a:avLst/>
+          </a:prstGeom>
+          <a:noFill/>
         </p:spPr>
         <p:txBody>
-          <a:bodyPr>
-            <a:normAutofit/>
+          <a:bodyPr wrap="square" rtlCol="0">
+            <a:spAutoFit/>
           </a:bodyPr>
           <a:lstStyle/>
           <a:p>
             <a:r>
               <a:rPr lang="en-US" dirty="0" smtClean="0"/>
-              <a:t>A business can be categorized as a pizza restaurant if it meets EITHER of the following criteria:</a:t>
-            </a:r>
-          </a:p>
-          <a:p>
-            <a:pPr lvl="1"/>
-            <a:r>
-              <a:rPr lang="en-US" dirty="0"/>
-              <a:t> </a:t>
-            </a:r>
-            <a:r>
-              <a:rPr lang="en-US" dirty="0" smtClean="0"/>
-              <a:t>SIC code is either 58120600, 58120601, or 5820602</a:t>
-            </a:r>
-          </a:p>
-          <a:p>
-            <a:pPr lvl="1"/>
-            <a:r>
-              <a:rPr lang="en-US" dirty="0"/>
-              <a:t> </a:t>
-            </a:r>
-            <a:r>
-              <a:rPr lang="en-US" dirty="0" smtClean="0"/>
-              <a:t>SIC code is within either of these </a:t>
-            </a:r>
-            <a:r>
-              <a:rPr lang="en-US" dirty="0" smtClean="0"/>
-              <a:t>ranges (inclusive): </a:t>
-            </a:r>
-            <a:r>
-              <a:rPr lang="en-US" dirty="0" smtClean="0"/>
-              <a:t>(54110000:54999999, 58120000:58129999) AND the word “pizza” or “pizzeria” is in the recorded company name or trade name </a:t>
+              <a:t>* Some exceptions apply</a:t>
             </a:r>
             <a:endParaRPr lang="en-US" dirty="0"/>
           </a:p>
@@ -4676,7 +3683,7 @@
     </p:spTree>
     <p:extLst>
       <p:ext uri="{BB962C8B-B14F-4D97-AF65-F5344CB8AC3E}">
-        <p14:creationId xmlns:p14="http://schemas.microsoft.com/office/powerpoint/2010/main" val="2099713553"/>
+        <p14:creationId xmlns:p14="http://schemas.microsoft.com/office/powerpoint/2010/main" val="508601886"/>
       </p:ext>
     </p:extLst>
   </p:cSld>
@@ -4727,7 +3734,7 @@
           <a:p>
             <a:r>
               <a:rPr lang="en-US" dirty="0" smtClean="0"/>
-              <a:t>Category Example:  Fish Markets</a:t>
+              <a:t>Category Example: Pizza</a:t>
             </a:r>
             <a:endParaRPr lang="en-US" dirty="0"/>
           </a:p>
@@ -4743,25 +3750,44 @@
             <p:ph idx="1"/>
           </p:nvPr>
         </p:nvSpPr>
-        <p:spPr/>
-        <p:txBody>
-          <a:bodyPr/>
-          <a:lstStyle/>
-          <a:p>
-            <a:r>
-              <a:rPr lang="en-US" dirty="0" smtClean="0"/>
-              <a:t>A business can be categorized as a fish market if it meets the following criteria:</a:t>
+        <p:spPr>
+          <a:xfrm>
+            <a:off x="228600" y="1600200"/>
+            <a:ext cx="8534400" cy="4525963"/>
+          </a:xfrm>
+        </p:spPr>
+        <p:txBody>
+          <a:bodyPr>
+            <a:normAutofit/>
+          </a:bodyPr>
+          <a:lstStyle/>
+          <a:p>
+            <a:r>
+              <a:rPr lang="en-US" dirty="0" smtClean="0"/>
+              <a:t>A business can be categorized as a pizza restaurant if it meets EITHER of the following criteria:</a:t>
             </a:r>
           </a:p>
           <a:p>
             <a:pPr lvl="1"/>
             <a:r>
-              <a:rPr lang="en-US" dirty="0" smtClean="0"/>
-              <a:t>SIC code is in the range of 54210100:54210199</a:t>
+              <a:rPr lang="en-US" dirty="0"/>
+              <a:t> </a:t>
+            </a:r>
+            <a:r>
+              <a:rPr lang="en-US" dirty="0" smtClean="0"/>
+              <a:t>SIC code is either 58120600, 58120601, or 5820602</a:t>
             </a:r>
           </a:p>
           <a:p>
             <a:pPr lvl="1"/>
+            <a:r>
+              <a:rPr lang="en-US" dirty="0"/>
+              <a:t> </a:t>
+            </a:r>
+            <a:r>
+              <a:rPr lang="en-US" dirty="0" smtClean="0"/>
+              <a:t>SIC code is within either of these ranges (inclusive): (54110000:54999999, 58120000:58129999) AND the word “pizza” or “pizzeria” is in the recorded company name or trade name </a:t>
+            </a:r>
             <a:endParaRPr lang="en-US" dirty="0"/>
           </a:p>
         </p:txBody>
@@ -4769,7 +3795,7 @@
     </p:spTree>
     <p:extLst>
       <p:ext uri="{BB962C8B-B14F-4D97-AF65-F5344CB8AC3E}">
-        <p14:creationId xmlns:p14="http://schemas.microsoft.com/office/powerpoint/2010/main" val="3727555106"/>
+        <p14:creationId xmlns:p14="http://schemas.microsoft.com/office/powerpoint/2010/main" val="2099713553"/>
       </p:ext>
     </p:extLst>
   </p:cSld>
@@ -4820,7 +3846,7 @@
           <a:p>
             <a:r>
               <a:rPr lang="en-US" dirty="0" smtClean="0"/>
-              <a:t>Categories:  Important to Note</a:t>
+              <a:t>Building a Category</a:t>
             </a:r>
             <a:endParaRPr lang="en-US" dirty="0"/>
           </a:p>
@@ -4843,34 +3869,13 @@
           <a:p>
             <a:r>
               <a:rPr lang="en-US" dirty="0" smtClean="0"/>
-              <a:t>Categories can be built on a variety of criteria, and can be straightforward SIC code classifications or include other more complex </a:t>
-            </a:r>
-            <a:r>
-              <a:rPr lang="en-US" dirty="0" smtClean="0"/>
-              <a:t>criteria</a:t>
-            </a:r>
-            <a:endParaRPr lang="en-US" dirty="0" smtClean="0"/>
-          </a:p>
-          <a:p>
-            <a:r>
-              <a:rPr lang="en-US" dirty="0" smtClean="0"/>
-              <a:t>Our native categories are not mutually </a:t>
-            </a:r>
-            <a:r>
-              <a:rPr lang="en-US" dirty="0" smtClean="0"/>
-              <a:t>exclusive by nature; </a:t>
-            </a:r>
-            <a:r>
-              <a:rPr lang="en-US" dirty="0" smtClean="0"/>
-              <a:t>a business can fit </a:t>
-            </a:r>
-            <a:r>
-              <a:rPr lang="en-US" dirty="0" smtClean="0"/>
-              <a:t>in more </a:t>
-            </a:r>
-            <a:r>
-              <a:rPr lang="en-US" dirty="0" smtClean="0"/>
-              <a:t>than one category</a:t>
+              <a:t>Categories can be straightforward collections of SIC codes, but often this is not comprehensive enough to address our needs</a:t>
+            </a:r>
+          </a:p>
+          <a:p>
+            <a:r>
+              <a:rPr lang="en-US" dirty="0" smtClean="0"/>
+              <a:t>Additional criteria are dependent on the needs of the researcher, as can be seen in the fast food, or “AFF” (all fast food) category we have created</a:t>
             </a:r>
             <a:endParaRPr lang="en-US" dirty="0"/>
           </a:p>
@@ -4879,20 +3884,13 @@
     </p:spTree>
     <p:extLst>
       <p:ext uri="{BB962C8B-B14F-4D97-AF65-F5344CB8AC3E}">
-        <p14:creationId xmlns:p14="http://schemas.microsoft.com/office/powerpoint/2010/main" val="508601886"/>
+        <p14:creationId xmlns:p14="http://schemas.microsoft.com/office/powerpoint/2010/main" val="3995602925"/>
       </p:ext>
     </p:extLst>
   </p:cSld>
   <p:clrMapOvr>
     <a:masterClrMapping/>
   </p:clrMapOvr>
-  <p:timing>
-    <p:tnLst>
-      <p:par>
-        <p:cTn id="1" dur="indefinite" restart="never" nodeType="tmRoot"/>
-      </p:par>
-    </p:tnLst>
-  </p:timing>
 </p:sld>
 </file>
 
@@ -4930,15 +3928,7 @@
           <a:p>
             <a:r>
               <a:rPr lang="en-US" dirty="0" smtClean="0"/>
-              <a:t>JSON (</a:t>
-            </a:r>
-            <a:r>
-              <a:rPr lang="en-US" dirty="0" smtClean="0"/>
-              <a:t>JavaScript </a:t>
-            </a:r>
-            <a:r>
-              <a:rPr lang="en-US" dirty="0" smtClean="0"/>
-              <a:t>Object Notation)</a:t>
+              <a:t>The AFF Category</a:t>
             </a:r>
             <a:endParaRPr lang="en-US" dirty="0"/>
           </a:p>
@@ -4956,56 +3946,28 @@
         </p:nvSpPr>
         <p:spPr/>
         <p:txBody>
-          <a:bodyPr/>
-          <a:lstStyle/>
-          <a:p>
-            <a:r>
-              <a:rPr lang="en-US" dirty="0" smtClean="0"/>
-              <a:t>Pronounced </a:t>
-            </a:r>
-            <a:r>
-              <a:rPr lang="en-US" dirty="0" smtClean="0"/>
-              <a:t>“</a:t>
-            </a:r>
-            <a:r>
-              <a:rPr lang="en-US" dirty="0" smtClean="0"/>
-              <a:t>Jay-</a:t>
-            </a:r>
-            <a:r>
-              <a:rPr lang="en-US" dirty="0" err="1" smtClean="0"/>
-              <a:t>sahn</a:t>
-            </a:r>
-            <a:r>
-              <a:rPr lang="en-US" dirty="0" smtClean="0"/>
-              <a:t>” or “Jason” (disputed)</a:t>
-            </a:r>
-          </a:p>
-          <a:p>
-            <a:r>
-              <a:rPr lang="en-US" dirty="0" smtClean="0"/>
-              <a:t>Derived closely from the description </a:t>
-            </a:r>
-            <a:r>
-              <a:rPr lang="en-US" dirty="0" smtClean="0"/>
-              <a:t>of objects in JavaScript</a:t>
-            </a:r>
-          </a:p>
-          <a:p>
-            <a:r>
-              <a:rPr lang="en-US" dirty="0"/>
-              <a:t>E</a:t>
-            </a:r>
-            <a:r>
-              <a:rPr lang="en-US" dirty="0" smtClean="0"/>
-              <a:t>asily parsed by computers and read by humans</a:t>
-            </a:r>
-          </a:p>
-          <a:p>
-            <a:r>
-              <a:rPr lang="en-US" dirty="0" smtClean="0"/>
-              <a:t>We store our business class characteristics in a JSON file to keep it separate from the code that wrangles the data</a:t>
-            </a:r>
-            <a:endParaRPr lang="en-US" dirty="0" smtClean="0"/>
+          <a:bodyPr>
+            <a:normAutofit/>
+          </a:bodyPr>
+          <a:lstStyle/>
+          <a:p>
+            <a:r>
+              <a:rPr lang="en-US" dirty="0" smtClean="0"/>
+              <a:t>We found it necessary to categorize fast food restaurants, but many restaurants that could be considered fast food did not use the fast food SIC codes (codes are self-reported)</a:t>
+            </a:r>
+          </a:p>
+          <a:p>
+            <a:pPr lvl="1"/>
+            <a:r>
+              <a:rPr lang="en-US" dirty="0" smtClean="0"/>
+              <a:t>Many would instead classify themselves based on the type of food they were serving, i.e. Papa John’s as a pizza restaurant</a:t>
+            </a:r>
+          </a:p>
+          <a:p>
+            <a:r>
+              <a:rPr lang="en-US" dirty="0" smtClean="0"/>
+              <a:t>We decided to search for outside information to help us to better classify AFF restaurants</a:t>
+            </a:r>
           </a:p>
           <a:p>
             <a:endParaRPr lang="en-US" dirty="0"/>
@@ -5015,20 +3977,13 @@
     </p:spTree>
     <p:extLst>
       <p:ext uri="{BB962C8B-B14F-4D97-AF65-F5344CB8AC3E}">
-        <p14:creationId xmlns:p14="http://schemas.microsoft.com/office/powerpoint/2010/main" val="2231327608"/>
+        <p14:creationId xmlns:p14="http://schemas.microsoft.com/office/powerpoint/2010/main" val="3105185657"/>
       </p:ext>
     </p:extLst>
   </p:cSld>
   <p:clrMapOvr>
     <a:masterClrMapping/>
   </p:clrMapOvr>
-  <p:timing>
-    <p:tnLst>
-      <p:par>
-        <p:cTn id="1" dur="indefinite" restart="never" nodeType="tmRoot"/>
-      </p:par>
-    </p:tnLst>
-  </p:timing>
 </p:sld>
 </file>
 
@@ -5051,7 +4006,7 @@
       </p:grpSpPr>
       <p:sp>
         <p:nvSpPr>
-          <p:cNvPr id="4" name="Title 3"/>
+          <p:cNvPr id="2" name="Title 1"/>
           <p:cNvSpPr>
             <a:spLocks noGrp="1"/>
           </p:cNvSpPr>
@@ -5059,19 +4014,14 @@
             <p:ph type="title"/>
           </p:nvPr>
         </p:nvSpPr>
-        <p:spPr>
-          <a:xfrm>
-            <a:off x="472016" y="304800"/>
-            <a:ext cx="8229600" cy="1143000"/>
-          </a:xfrm>
-        </p:spPr>
-        <p:txBody>
-          <a:bodyPr/>
-          <a:lstStyle/>
-          <a:p>
-            <a:r>
-              <a:rPr lang="en-US" dirty="0" smtClean="0"/>
-              <a:t>JSON Syntax Rules</a:t>
+        <p:spPr/>
+        <p:txBody>
+          <a:bodyPr/>
+          <a:lstStyle/>
+          <a:p>
+            <a:r>
+              <a:rPr lang="en-US" dirty="0" smtClean="0"/>
+              <a:t>The AFF Category</a:t>
             </a:r>
             <a:endParaRPr lang="en-US" dirty="0"/>
           </a:p>
@@ -5079,383 +4029,36 @@
       </p:sp>
       <p:sp>
         <p:nvSpPr>
-          <p:cNvPr id="5" name="Content Placeholder 4"/>
-          <p:cNvSpPr>
-            <a:spLocks noGrp="1"/>
-          </p:cNvSpPr>
-          <p:nvPr>
-            <p:ph sz="half" idx="1"/>
-          </p:nvPr>
-        </p:nvSpPr>
-        <p:spPr/>
-        <p:txBody>
-          <a:bodyPr>
-            <a:normAutofit fontScale="92500" lnSpcReduction="10000"/>
-          </a:bodyPr>
-          <a:lstStyle/>
-          <a:p>
-            <a:r>
-              <a:rPr lang="en-US" dirty="0" smtClean="0"/>
-              <a:t>JSON syntax is derived from JavaScript object notation syntax</a:t>
-            </a:r>
-          </a:p>
-          <a:p>
-            <a:pPr lvl="1"/>
-            <a:r>
-              <a:rPr lang="en-US" dirty="0" smtClean="0"/>
-              <a:t>Data is in name/value pairs</a:t>
-            </a:r>
-          </a:p>
-          <a:p>
-            <a:pPr lvl="1"/>
-            <a:r>
-              <a:rPr lang="en-US" dirty="0" smtClean="0"/>
-              <a:t>Data is separated by commas</a:t>
-            </a:r>
-          </a:p>
-          <a:p>
-            <a:pPr lvl="1"/>
-            <a:r>
-              <a:rPr lang="en-US" dirty="0" smtClean="0"/>
-              <a:t>Curly braces hold objects</a:t>
-            </a:r>
-          </a:p>
-          <a:p>
-            <a:pPr lvl="1"/>
-            <a:r>
-              <a:rPr lang="en-US" dirty="0" smtClean="0"/>
-              <a:t>Square braces hold arrays (lists of data, or objects)</a:t>
-            </a:r>
-          </a:p>
-          <a:p>
-            <a:r>
-              <a:rPr lang="en-US" dirty="0" smtClean="0"/>
-              <a:t>Find more details and documentation on using JSON </a:t>
-            </a:r>
-            <a:r>
-              <a:rPr lang="en-US" dirty="0" smtClean="0">
-                <a:hlinkClick r:id="rId2"/>
-              </a:rPr>
-              <a:t>here</a:t>
-            </a:r>
-            <a:endParaRPr lang="en-US" dirty="0" smtClean="0"/>
-          </a:p>
-          <a:p>
-            <a:endParaRPr lang="en-US" dirty="0" smtClean="0"/>
-          </a:p>
-        </p:txBody>
-      </p:sp>
-      <p:sp>
-        <p:nvSpPr>
-          <p:cNvPr id="6" name="Content Placeholder 5"/>
-          <p:cNvSpPr>
-            <a:spLocks noGrp="1"/>
-          </p:cNvSpPr>
-          <p:nvPr>
-            <p:ph sz="half" idx="2"/>
-          </p:nvPr>
-        </p:nvSpPr>
-        <p:spPr/>
-        <p:txBody>
-          <a:bodyPr>
-            <a:normAutofit fontScale="92500" lnSpcReduction="10000"/>
-          </a:bodyPr>
-          <a:lstStyle/>
-          <a:p>
-            <a:endParaRPr lang="en-US" dirty="0"/>
-          </a:p>
-        </p:txBody>
-      </p:sp>
-      <p:pic>
-        <p:nvPicPr>
-          <p:cNvPr id="1026" name="Picture 2"/>
-          <p:cNvPicPr>
-            <a:picLocks noChangeAspect="1" noChangeArrowheads="1"/>
-          </p:cNvPicPr>
-          <p:nvPr/>
-        </p:nvPicPr>
-        <p:blipFill>
-          <a:blip r:embed="rId3">
-            <a:extLst>
-              <a:ext uri="{28A0092B-C50C-407E-A947-70E740481C1C}">
-                <a14:useLocalDpi xmlns:a14="http://schemas.microsoft.com/office/drawing/2010/main" val="0"/>
-              </a:ext>
-            </a:extLst>
-          </a:blip>
-          <a:srcRect/>
-          <a:stretch>
-            <a:fillRect/>
-          </a:stretch>
-        </p:blipFill>
-        <p:spPr bwMode="auto">
-          <a:xfrm>
-            <a:off x="4485503" y="1905000"/>
-            <a:ext cx="4230529" cy="4114800"/>
-          </a:xfrm>
-          <a:prstGeom prst="rect">
-            <a:avLst/>
-          </a:prstGeom>
-          <a:noFill/>
-          <a:ln>
-            <a:noFill/>
-          </a:ln>
-          <a:effectLst/>
-          <a:extLst>
-            <a:ext uri="{909E8E84-426E-40DD-AFC4-6F175D3DCCD1}">
-              <a14:hiddenFill xmlns:a14="http://schemas.microsoft.com/office/drawing/2010/main">
-                <a:solidFill>
-                  <a:schemeClr val="accent1"/>
-                </a:solidFill>
-              </a14:hiddenFill>
-            </a:ext>
-            <a:ext uri="{91240B29-F687-4F45-9708-019B960494DF}">
-              <a14:hiddenLine xmlns:a14="http://schemas.microsoft.com/office/drawing/2010/main" w="9525">
-                <a:solidFill>
-                  <a:schemeClr val="tx1"/>
-                </a:solidFill>
-                <a:miter lim="800000"/>
-                <a:headEnd/>
-                <a:tailEnd/>
-              </a14:hiddenLine>
-            </a:ext>
-            <a:ext uri="{AF507438-7753-43E0-B8FC-AC1667EBCBE1}">
-              <a14:hiddenEffects xmlns:a14="http://schemas.microsoft.com/office/drawing/2010/main">
-                <a:effectLst>
-                  <a:outerShdw dist="35921" dir="2700000" algn="ctr" rotWithShape="0">
-                    <a:schemeClr val="bg2"/>
-                  </a:outerShdw>
-                </a:effectLst>
-              </a14:hiddenEffects>
-            </a:ext>
-          </a:extLst>
-        </p:spPr>
-      </p:pic>
-      <p:cxnSp>
-        <p:nvCxnSpPr>
-          <p:cNvPr id="8" name="Straight Arrow Connector 7"/>
-          <p:cNvCxnSpPr/>
-          <p:nvPr/>
-        </p:nvCxnSpPr>
-        <p:spPr>
-          <a:xfrm flipH="1">
-            <a:off x="5753100" y="1546654"/>
-            <a:ext cx="609600" cy="533400"/>
-          </a:xfrm>
-          <a:prstGeom prst="straightConnector1">
-            <a:avLst/>
-          </a:prstGeom>
-          <a:ln>
-            <a:tailEnd type="arrow"/>
-          </a:ln>
-        </p:spPr>
-        <p:style>
-          <a:lnRef idx="1">
-            <a:schemeClr val="accent1"/>
-          </a:lnRef>
-          <a:fillRef idx="0">
-            <a:schemeClr val="accent1"/>
-          </a:fillRef>
-          <a:effectRef idx="0">
-            <a:schemeClr val="accent1"/>
-          </a:effectRef>
-          <a:fontRef idx="minor">
-            <a:schemeClr val="tx1"/>
-          </a:fontRef>
-        </p:style>
-      </p:cxnSp>
-      <p:cxnSp>
-        <p:nvCxnSpPr>
-          <p:cNvPr id="11" name="Straight Arrow Connector 10"/>
-          <p:cNvCxnSpPr/>
-          <p:nvPr/>
-        </p:nvCxnSpPr>
-        <p:spPr>
-          <a:xfrm flipH="1">
-            <a:off x="6600767" y="1432354"/>
-            <a:ext cx="1019233" cy="914400"/>
-          </a:xfrm>
-          <a:prstGeom prst="straightConnector1">
-            <a:avLst/>
-          </a:prstGeom>
-          <a:ln>
-            <a:tailEnd type="arrow"/>
-          </a:ln>
-        </p:spPr>
-        <p:style>
-          <a:lnRef idx="1">
-            <a:schemeClr val="accent1"/>
-          </a:lnRef>
-          <a:fillRef idx="0">
-            <a:schemeClr val="accent1"/>
-          </a:fillRef>
-          <a:effectRef idx="0">
-            <a:schemeClr val="accent1"/>
-          </a:effectRef>
-          <a:fontRef idx="minor">
-            <a:schemeClr val="tx1"/>
-          </a:fontRef>
-        </p:style>
-      </p:cxnSp>
-      <p:cxnSp>
-        <p:nvCxnSpPr>
-          <p:cNvPr id="13" name="Straight Arrow Connector 12"/>
-          <p:cNvCxnSpPr/>
-          <p:nvPr/>
-        </p:nvCxnSpPr>
-        <p:spPr>
-          <a:xfrm flipH="1">
-            <a:off x="6781800" y="2209800"/>
-            <a:ext cx="1447800" cy="1371600"/>
-          </a:xfrm>
-          <a:prstGeom prst="straightConnector1">
-            <a:avLst/>
-          </a:prstGeom>
-          <a:ln>
-            <a:tailEnd type="arrow"/>
-          </a:ln>
-        </p:spPr>
-        <p:style>
-          <a:lnRef idx="1">
-            <a:schemeClr val="accent1"/>
-          </a:lnRef>
-          <a:fillRef idx="0">
-            <a:schemeClr val="accent1"/>
-          </a:fillRef>
-          <a:effectRef idx="0">
-            <a:schemeClr val="accent1"/>
-          </a:effectRef>
-          <a:fontRef idx="minor">
-            <a:schemeClr val="tx1"/>
-          </a:fontRef>
-        </p:style>
-      </p:cxnSp>
-      <p:sp>
-        <p:nvSpPr>
-          <p:cNvPr id="14" name="Rectangle 13"/>
-          <p:cNvSpPr/>
-          <p:nvPr/>
-        </p:nvSpPr>
-        <p:spPr>
-          <a:xfrm>
-            <a:off x="6036276" y="1257300"/>
-            <a:ext cx="838200" cy="381000"/>
-          </a:xfrm>
-          <a:prstGeom prst="rect">
-            <a:avLst/>
-          </a:prstGeom>
-        </p:spPr>
-        <p:style>
-          <a:lnRef idx="2">
-            <a:schemeClr val="accent1">
-              <a:shade val="50000"/>
-            </a:schemeClr>
-          </a:lnRef>
-          <a:fillRef idx="1">
-            <a:schemeClr val="accent1"/>
-          </a:fillRef>
-          <a:effectRef idx="0">
-            <a:schemeClr val="accent1"/>
-          </a:effectRef>
-          <a:fontRef idx="minor">
-            <a:schemeClr val="lt1"/>
-          </a:fontRef>
-        </p:style>
-        <p:txBody>
-          <a:bodyPr rtlCol="0" anchor="ctr"/>
-          <a:lstStyle/>
-          <a:p>
-            <a:pPr algn="ctr"/>
-            <a:r>
-              <a:rPr lang="en-US" dirty="0" smtClean="0"/>
-              <a:t>Object</a:t>
-            </a:r>
-            <a:endParaRPr lang="en-US" dirty="0"/>
-          </a:p>
-        </p:txBody>
-      </p:sp>
-      <p:sp>
-        <p:nvSpPr>
-          <p:cNvPr id="16" name="Rectangle 15"/>
-          <p:cNvSpPr/>
-          <p:nvPr/>
-        </p:nvSpPr>
-        <p:spPr>
-          <a:xfrm>
-            <a:off x="7234881" y="1089454"/>
-            <a:ext cx="838200" cy="381000"/>
-          </a:xfrm>
-          <a:prstGeom prst="rect">
-            <a:avLst/>
-          </a:prstGeom>
-        </p:spPr>
-        <p:style>
-          <a:lnRef idx="2">
-            <a:schemeClr val="accent1">
-              <a:shade val="50000"/>
-            </a:schemeClr>
-          </a:lnRef>
-          <a:fillRef idx="1">
-            <a:schemeClr val="accent1"/>
-          </a:fillRef>
-          <a:effectRef idx="0">
-            <a:schemeClr val="accent1"/>
-          </a:effectRef>
-          <a:fontRef idx="minor">
-            <a:schemeClr val="lt1"/>
-          </a:fontRef>
-        </p:style>
-        <p:txBody>
-          <a:bodyPr rtlCol="0" anchor="ctr"/>
-          <a:lstStyle/>
-          <a:p>
-            <a:pPr algn="ctr"/>
-            <a:r>
-              <a:rPr lang="en-US" dirty="0" smtClean="0"/>
-              <a:t>Array</a:t>
-            </a:r>
-            <a:endParaRPr lang="en-US" dirty="0"/>
-          </a:p>
-        </p:txBody>
-      </p:sp>
-      <p:sp>
-        <p:nvSpPr>
-          <p:cNvPr id="17" name="Rectangle 16"/>
-          <p:cNvSpPr/>
-          <p:nvPr/>
-        </p:nvSpPr>
-        <p:spPr>
-          <a:xfrm>
-            <a:off x="7810500" y="1889554"/>
-            <a:ext cx="838200" cy="381000"/>
-          </a:xfrm>
-          <a:prstGeom prst="rect">
-            <a:avLst/>
-          </a:prstGeom>
-        </p:spPr>
-        <p:style>
-          <a:lnRef idx="2">
-            <a:schemeClr val="accent1">
-              <a:shade val="50000"/>
-            </a:schemeClr>
-          </a:lnRef>
-          <a:fillRef idx="1">
-            <a:schemeClr val="accent1"/>
-          </a:fillRef>
-          <a:effectRef idx="0">
-            <a:schemeClr val="accent1"/>
-          </a:effectRef>
-          <a:fontRef idx="minor">
-            <a:schemeClr val="lt1"/>
-          </a:fontRef>
-        </p:style>
-        <p:txBody>
-          <a:bodyPr rtlCol="0" anchor="ctr"/>
-          <a:lstStyle/>
-          <a:p>
-            <a:pPr algn="ctr"/>
-            <a:r>
-              <a:rPr lang="en-US" dirty="0" smtClean="0"/>
-              <a:t>Data</a:t>
+          <p:cNvPr id="3" name="Content Placeholder 2"/>
+          <p:cNvSpPr>
+            <a:spLocks noGrp="1"/>
+          </p:cNvSpPr>
+          <p:nvPr>
+            <p:ph idx="1"/>
+          </p:nvPr>
+        </p:nvSpPr>
+        <p:spPr/>
+        <p:txBody>
+          <a:bodyPr/>
+          <a:lstStyle/>
+          <a:p>
+            <a:r>
+              <a:rPr lang="en-US" dirty="0" err="1"/>
+              <a:t>Technomic</a:t>
+            </a:r>
+            <a:r>
+              <a:rPr lang="en-US" dirty="0"/>
+              <a:t> is a research and consulting firm servicing the food and foodservice </a:t>
+            </a:r>
+            <a:r>
+              <a:rPr lang="en-US" dirty="0" smtClean="0"/>
+              <a:t>industry</a:t>
+            </a:r>
+          </a:p>
+          <a:p>
+            <a:r>
+              <a:rPr lang="en-US" dirty="0" smtClean="0"/>
+              <a:t>We incorporated their research on the top 100 chain fast food restaurants by categorizing restaurants as AFF if they had SIC codes beginning with 5812 (eating places) and the company name was similar to any of these 100 names</a:t>
             </a:r>
             <a:endParaRPr lang="en-US" dirty="0"/>
           </a:p>
@@ -5464,20 +4067,13 @@
     </p:spTree>
     <p:extLst>
       <p:ext uri="{BB962C8B-B14F-4D97-AF65-F5344CB8AC3E}">
-        <p14:creationId xmlns:p14="http://schemas.microsoft.com/office/powerpoint/2010/main" val="2733485742"/>
+        <p14:creationId xmlns:p14="http://schemas.microsoft.com/office/powerpoint/2010/main" val="352811112"/>
       </p:ext>
     </p:extLst>
   </p:cSld>
   <p:clrMapOvr>
     <a:masterClrMapping/>
   </p:clrMapOvr>
-  <p:timing>
-    <p:tnLst>
-      <p:par>
-        <p:cTn id="1" dur="indefinite" restart="never" nodeType="tmRoot"/>
-      </p:par>
-    </p:tnLst>
-  </p:timing>
 </p:sld>
 </file>
 
@@ -5515,7 +4111,7 @@
           <a:p>
             <a:r>
               <a:rPr lang="en-US" dirty="0" smtClean="0"/>
-              <a:t>Two Ways to Work with JSON</a:t>
+              <a:t>Regional Category Adjustments</a:t>
             </a:r>
             <a:endParaRPr lang="en-US" dirty="0"/>
           </a:p>
@@ -5528,135 +4124,62 @@
             <a:spLocks noGrp="1"/>
           </p:cNvSpPr>
           <p:nvPr>
-            <p:ph sz="half" idx="1"/>
+            <p:ph idx="1"/>
           </p:nvPr>
         </p:nvSpPr>
         <p:spPr/>
         <p:txBody>
           <a:bodyPr>
-            <a:normAutofit fontScale="92500"/>
+            <a:normAutofit lnSpcReduction="10000"/>
           </a:bodyPr>
           <a:lstStyle/>
           <a:p>
             <a:r>
               <a:rPr lang="en-US" dirty="0" smtClean="0"/>
-              <a:t>Desktop – Notepad++</a:t>
-            </a:r>
-          </a:p>
-          <a:p>
-            <a:pPr lvl="1"/>
-            <a:r>
-              <a:rPr lang="en-US" dirty="0" smtClean="0"/>
-              <a:t>JSON files can be opened using any text editor</a:t>
-            </a:r>
-          </a:p>
-          <a:p>
-            <a:pPr lvl="1"/>
-            <a:r>
-              <a:rPr lang="en-US" dirty="0" smtClean="0"/>
-              <a:t>Download Notepad++ </a:t>
-            </a:r>
-            <a:r>
-              <a:rPr lang="en-US" dirty="0" smtClean="0">
-                <a:hlinkClick r:id="rId2"/>
-              </a:rPr>
-              <a:t>here</a:t>
-            </a:r>
-            <a:endParaRPr lang="en-US" dirty="0" smtClean="0"/>
-          </a:p>
-          <a:p>
-            <a:pPr lvl="1"/>
-            <a:r>
-              <a:rPr lang="en-US" dirty="0" smtClean="0"/>
-              <a:t>Download and install the JSON viewer plugin </a:t>
-            </a:r>
-            <a:r>
-              <a:rPr lang="en-US" dirty="0" smtClean="0">
-                <a:hlinkClick r:id="rId3"/>
-              </a:rPr>
-              <a:t>here</a:t>
-            </a:r>
-            <a:endParaRPr lang="en-US" dirty="0" smtClean="0"/>
-          </a:p>
-          <a:p>
-            <a:pPr lvl="2"/>
-            <a:r>
-              <a:rPr lang="en-US" dirty="0" smtClean="0"/>
-              <a:t>This will perform text highlighting, check for syntax errors, and auto indent</a:t>
+              <a:t>Occasionally categories may benefit from adjustments based on specific regions</a:t>
+            </a:r>
+          </a:p>
+          <a:p>
+            <a:r>
+              <a:rPr lang="en-US" dirty="0" smtClean="0"/>
+              <a:t>For example, in New York City we have a hot dog fast food chain called “Papaya King” which is not found elsewhere.</a:t>
+            </a:r>
+          </a:p>
+          <a:p>
+            <a:r>
+              <a:rPr lang="en-US" dirty="0" smtClean="0"/>
+              <a:t>We brainstormed (</a:t>
+            </a:r>
+            <a:r>
+              <a:rPr lang="en-US" i="1" dirty="0" smtClean="0"/>
+              <a:t>is this how we got these?)</a:t>
+            </a:r>
+            <a:r>
+              <a:rPr lang="en-US" dirty="0" smtClean="0"/>
+              <a:t> a list of NYC specific fast food chains and added them to the </a:t>
+            </a:r>
+            <a:r>
+              <a:rPr lang="en-US" dirty="0" err="1" smtClean="0"/>
+              <a:t>Technomic</a:t>
+            </a:r>
+            <a:r>
+              <a:rPr lang="en-US" dirty="0" smtClean="0"/>
+              <a:t> list when working with NYC data</a:t>
             </a:r>
             <a:endParaRPr lang="en-US" dirty="0"/>
-          </a:p>
-        </p:txBody>
-      </p:sp>
-      <p:sp>
-        <p:nvSpPr>
-          <p:cNvPr id="4" name="Content Placeholder 3"/>
-          <p:cNvSpPr>
-            <a:spLocks noGrp="1"/>
-          </p:cNvSpPr>
-          <p:nvPr>
-            <p:ph sz="half" idx="2"/>
-          </p:nvPr>
-        </p:nvSpPr>
-        <p:spPr/>
-        <p:txBody>
-          <a:bodyPr>
-            <a:normAutofit fontScale="92500"/>
-          </a:bodyPr>
-          <a:lstStyle/>
-          <a:p>
-            <a:r>
-              <a:rPr lang="en-US" dirty="0" smtClean="0"/>
-              <a:t>Browser – JSON Editor</a:t>
-            </a:r>
-          </a:p>
-          <a:p>
-            <a:pPr lvl="1"/>
-            <a:r>
-              <a:rPr lang="en-US" dirty="0" smtClean="0"/>
-              <a:t>Downloadable from the Google Chrome app store</a:t>
-            </a:r>
-          </a:p>
-          <a:p>
-            <a:pPr lvl="1"/>
-            <a:r>
-              <a:rPr lang="en-US" dirty="0" smtClean="0"/>
-              <a:t>Create and edit JSON documents from your browser</a:t>
-            </a:r>
-          </a:p>
-          <a:p>
-            <a:pPr lvl="1"/>
-            <a:r>
-              <a:rPr lang="en-US" dirty="0" smtClean="0"/>
-              <a:t>Pro:  Easier to setup and work with than Notepad++</a:t>
-            </a:r>
-          </a:p>
-          <a:p>
-            <a:pPr lvl="1"/>
-            <a:r>
-              <a:rPr lang="en-US" dirty="0" smtClean="0"/>
-              <a:t>Con:  Can’t directly edit files on your machine without uploading/downloading</a:t>
-            </a:r>
           </a:p>
         </p:txBody>
       </p:sp>
     </p:spTree>
     <p:extLst>
       <p:ext uri="{BB962C8B-B14F-4D97-AF65-F5344CB8AC3E}">
-        <p14:creationId xmlns:p14="http://schemas.microsoft.com/office/powerpoint/2010/main" val="1262857032"/>
+        <p14:creationId xmlns:p14="http://schemas.microsoft.com/office/powerpoint/2010/main" val="2557901648"/>
       </p:ext>
     </p:extLst>
   </p:cSld>
   <p:clrMapOvr>
     <a:masterClrMapping/>
   </p:clrMapOvr>
-  <p:timing>
-    <p:tnLst>
-      <p:par>
-        <p:cTn id="1" dur="indefinite" restart="never" nodeType="tmRoot"/>
-      </p:par>
-    </p:tnLst>
-  </p:timing>
 </p:sld>
 </file>
 
@@ -5679,7 +4202,7 @@
       </p:grpSpPr>
       <p:sp>
         <p:nvSpPr>
-          <p:cNvPr id="5" name="Title 4"/>
+          <p:cNvPr id="2" name="Title 1"/>
           <p:cNvSpPr>
             <a:spLocks noGrp="1"/>
           </p:cNvSpPr>
@@ -5694,7 +4217,7 @@
           <a:p>
             <a:r>
               <a:rPr lang="en-US" dirty="0" smtClean="0"/>
-              <a:t>Defining Categories</a:t>
+              <a:t>Physical Activity Facility Categories</a:t>
             </a:r>
             <a:endParaRPr lang="en-US" dirty="0"/>
           </a:p>
@@ -5702,7 +4225,7 @@
       </p:sp>
       <p:sp>
         <p:nvSpPr>
-          <p:cNvPr id="6" name="Content Placeholder 5"/>
+          <p:cNvPr id="3" name="Content Placeholder 2"/>
           <p:cNvSpPr>
             <a:spLocks noGrp="1"/>
           </p:cNvSpPr>
@@ -5713,153 +4236,47 @@
         <p:spPr/>
         <p:txBody>
           <a:bodyPr>
-            <a:noAutofit/>
+            <a:normAutofit fontScale="92500" lnSpcReduction="10000"/>
           </a:bodyPr>
           <a:lstStyle/>
           <a:p>
             <a:r>
-              <a:rPr lang="en-US" sz="2000" dirty="0" smtClean="0"/>
-              <a:t>Categories are built by one or more true false questions based on:</a:t>
+              <a:rPr lang="en-US" dirty="0" smtClean="0"/>
+              <a:t>We wanted to break up Physical Activity Facilities into a few more specific categories, but this was not possible using only SIC codes.  We identified the following:</a:t>
+            </a:r>
+          </a:p>
+          <a:p>
+            <a:r>
+              <a:rPr lang="en-US" dirty="0" smtClean="0"/>
+              <a:t>Multi-Use Facilities:  Facilities used for exercise as well as other activities.  We used a number of SIC codes as well as a text search for common names of institutions that served mainly as:</a:t>
             </a:r>
           </a:p>
           <a:p>
             <a:pPr lvl="1"/>
             <a:r>
-              <a:rPr lang="en-US" sz="2000" b="1" dirty="0" smtClean="0"/>
-              <a:t>name</a:t>
-            </a:r>
-            <a:r>
-              <a:rPr lang="en-US" sz="2000" dirty="0" smtClean="0"/>
-              <a:t> </a:t>
-            </a:r>
-            <a:r>
-              <a:rPr lang="en-US" sz="2000" dirty="0"/>
-              <a:t>-&gt; Key word or list of key words corresponding to a given business category. True if the any of the key words can be found in the business name by using </a:t>
-            </a:r>
-            <a:r>
-              <a:rPr lang="en-US" sz="2000" dirty="0" smtClean="0"/>
-              <a:t>Python's </a:t>
-            </a:r>
-            <a:r>
-              <a:rPr lang="en-US" sz="1600" dirty="0" err="1" smtClean="0">
-                <a:latin typeface="Courier New" pitchFamily="49" charset="0"/>
-                <a:cs typeface="Courier New" pitchFamily="49" charset="0"/>
-              </a:rPr>
-              <a:t>business_name.find</a:t>
-            </a:r>
-            <a:r>
-              <a:rPr lang="en-US" sz="1600" dirty="0">
-                <a:latin typeface="Courier New" pitchFamily="49" charset="0"/>
-                <a:cs typeface="Courier New" pitchFamily="49" charset="0"/>
-              </a:rPr>
-              <a:t>('keyword')</a:t>
+              <a:rPr lang="en-US" dirty="0" smtClean="0"/>
+              <a:t>Youth centers</a:t>
             </a:r>
           </a:p>
           <a:p>
             <a:pPr lvl="1"/>
             <a:r>
-              <a:rPr lang="en-US" sz="2000" b="1" dirty="0" err="1"/>
-              <a:t>sic_exclusive</a:t>
-            </a:r>
-            <a:r>
-              <a:rPr lang="en-US" sz="2000" dirty="0"/>
-              <a:t> -&gt; A list of unique SIC codes. True if the </a:t>
-            </a:r>
-            <a:r>
-              <a:rPr lang="en-US" sz="2000" dirty="0" smtClean="0"/>
-              <a:t>business </a:t>
-            </a:r>
-            <a:r>
-              <a:rPr lang="en-US" sz="2000" dirty="0"/>
-              <a:t>SIC code is located in the </a:t>
-            </a:r>
-            <a:r>
-              <a:rPr lang="en-US" sz="2000" dirty="0" err="1"/>
-              <a:t>sic_exclusive</a:t>
-            </a:r>
-            <a:endParaRPr lang="en-US" sz="2000" dirty="0"/>
-          </a:p>
-          <a:p>
-            <a:pPr lvl="1"/>
-            <a:r>
-              <a:rPr lang="en-US" sz="2000" b="1" dirty="0" err="1"/>
-              <a:t>sic_range</a:t>
-            </a:r>
-            <a:r>
-              <a:rPr lang="en-US" sz="2000" dirty="0"/>
-              <a:t> -&gt; An inclusive range of SIC codes, or list of ranges. True if the business SIC code is within any of the </a:t>
-            </a:r>
-            <a:r>
-              <a:rPr lang="en-US" sz="2000" dirty="0" err="1"/>
-              <a:t>sic_ranges</a:t>
-            </a:r>
-            <a:endParaRPr lang="en-US" sz="2000" dirty="0"/>
-          </a:p>
-          <a:p>
-            <a:pPr lvl="1"/>
-            <a:r>
-              <a:rPr lang="en-US" sz="2000" b="1" dirty="0" err="1"/>
-              <a:t>emp</a:t>
-            </a:r>
-            <a:r>
-              <a:rPr lang="en-US" sz="2000" dirty="0"/>
-              <a:t> -&gt; Number of business employees. True if the number of business employees is within the range explicitly specified by the category</a:t>
-            </a:r>
-          </a:p>
-          <a:p>
-            <a:pPr lvl="1"/>
-            <a:r>
-              <a:rPr lang="en-US" sz="2000" b="1" dirty="0"/>
-              <a:t>sales</a:t>
-            </a:r>
-            <a:r>
-              <a:rPr lang="en-US" sz="2000" dirty="0"/>
-              <a:t> -&gt; Dollar amount of annual sales. True if the sales of the business is within the range explicitly specified by the category</a:t>
-            </a:r>
-          </a:p>
-          <a:p>
-            <a:pPr lvl="1"/>
-            <a:r>
-              <a:rPr lang="en-US" sz="2000" b="1" dirty="0"/>
-              <a:t>sic_range2</a:t>
-            </a:r>
-            <a:r>
-              <a:rPr lang="en-US" sz="2000" dirty="0"/>
-              <a:t> -&gt; same as </a:t>
-            </a:r>
-            <a:r>
-              <a:rPr lang="en-US" sz="2000" dirty="0" err="1"/>
-              <a:t>sic_range</a:t>
-            </a:r>
-            <a:r>
-              <a:rPr lang="en-US" sz="2000" dirty="0"/>
-              <a:t>, used if separate ranges apply to different parts of the </a:t>
-            </a:r>
-            <a:r>
-              <a:rPr lang="en-US" sz="2000" dirty="0" smtClean="0"/>
-              <a:t>conditional</a:t>
-            </a:r>
-            <a:endParaRPr lang="en-US" sz="2000" dirty="0"/>
+              <a:rPr lang="en-US" dirty="0" smtClean="0"/>
+              <a:t>Religious or cultural community centers</a:t>
+            </a:r>
           </a:p>
         </p:txBody>
       </p:sp>
     </p:spTree>
     <p:extLst>
       <p:ext uri="{BB962C8B-B14F-4D97-AF65-F5344CB8AC3E}">
-        <p14:creationId xmlns:p14="http://schemas.microsoft.com/office/powerpoint/2010/main" val="2596695105"/>
+        <p14:creationId xmlns:p14="http://schemas.microsoft.com/office/powerpoint/2010/main" val="838425837"/>
       </p:ext>
     </p:extLst>
   </p:cSld>
   <p:clrMapOvr>
     <a:masterClrMapping/>
   </p:clrMapOvr>
-  <p:timing>
-    <p:tnLst>
-      <p:par>
-        <p:cTn id="1" dur="indefinite" restart="never" nodeType="tmRoot"/>
-      </p:par>
-    </p:tnLst>
-  </p:timing>
 </p:sld>
 </file>
 

</xml_diff>